<commit_message>
backend with auth on form start
</commit_message>
<xml_diff>
--- a/radica.pptx
+++ b/radica.pptx
@@ -864,6 +864,753 @@
 </dgm:colorsDef>
 </file>
 
+<file path=ppt/diagrams/colors2.xml><?xml version="1.0" encoding="utf-8"?>
+<dgm:colorsDef xmlns:dgm="http://schemas.openxmlformats.org/drawingml/2006/diagram" xmlns:a="http://schemas.openxmlformats.org/drawingml/2006/main" uniqueId="urn:microsoft.com/office/officeart/2005/8/colors/accent1_2">
+  <dgm:title val=""/>
+  <dgm:desc val=""/>
+  <dgm:catLst>
+    <dgm:cat type="accent1" pri="11200"/>
+  </dgm:catLst>
+  <dgm:styleLbl name="node0">
+    <dgm:fillClrLst meth="repeat">
+      <a:schemeClr val="accent1"/>
+    </dgm:fillClrLst>
+    <dgm:linClrLst meth="repeat">
+      <a:schemeClr val="lt1"/>
+    </dgm:linClrLst>
+    <dgm:effectClrLst/>
+    <dgm:txLinClrLst/>
+    <dgm:txFillClrLst/>
+    <dgm:txEffectClrLst/>
+  </dgm:styleLbl>
+  <dgm:styleLbl name="alignNode1">
+    <dgm:fillClrLst meth="repeat">
+      <a:schemeClr val="accent1"/>
+    </dgm:fillClrLst>
+    <dgm:linClrLst meth="repeat">
+      <a:schemeClr val="accent1"/>
+    </dgm:linClrLst>
+    <dgm:effectClrLst/>
+    <dgm:txLinClrLst/>
+    <dgm:txFillClrLst/>
+    <dgm:txEffectClrLst/>
+  </dgm:styleLbl>
+  <dgm:styleLbl name="node1">
+    <dgm:fillClrLst meth="repeat">
+      <a:schemeClr val="accent1"/>
+    </dgm:fillClrLst>
+    <dgm:linClrLst meth="repeat">
+      <a:schemeClr val="lt1"/>
+    </dgm:linClrLst>
+    <dgm:effectClrLst/>
+    <dgm:txLinClrLst/>
+    <dgm:txFillClrLst/>
+    <dgm:txEffectClrLst/>
+  </dgm:styleLbl>
+  <dgm:styleLbl name="lnNode1">
+    <dgm:fillClrLst meth="repeat">
+      <a:schemeClr val="accent1"/>
+    </dgm:fillClrLst>
+    <dgm:linClrLst meth="repeat">
+      <a:schemeClr val="lt1"/>
+    </dgm:linClrLst>
+    <dgm:effectClrLst/>
+    <dgm:txLinClrLst/>
+    <dgm:txFillClrLst/>
+    <dgm:txEffectClrLst/>
+  </dgm:styleLbl>
+  <dgm:styleLbl name="vennNode1">
+    <dgm:fillClrLst meth="repeat">
+      <a:schemeClr val="accent1">
+        <a:alpha val="50000"/>
+      </a:schemeClr>
+    </dgm:fillClrLst>
+    <dgm:linClrLst meth="repeat">
+      <a:schemeClr val="lt1"/>
+    </dgm:linClrLst>
+    <dgm:effectClrLst/>
+    <dgm:txLinClrLst/>
+    <dgm:txFillClrLst/>
+    <dgm:txEffectClrLst/>
+  </dgm:styleLbl>
+  <dgm:styleLbl name="node2">
+    <dgm:fillClrLst meth="repeat">
+      <a:schemeClr val="accent1"/>
+    </dgm:fillClrLst>
+    <dgm:linClrLst meth="repeat">
+      <a:schemeClr val="lt1"/>
+    </dgm:linClrLst>
+    <dgm:effectClrLst/>
+    <dgm:txLinClrLst/>
+    <dgm:txFillClrLst/>
+    <dgm:txEffectClrLst/>
+  </dgm:styleLbl>
+  <dgm:styleLbl name="node3">
+    <dgm:fillClrLst meth="repeat">
+      <a:schemeClr val="accent1"/>
+    </dgm:fillClrLst>
+    <dgm:linClrLst meth="repeat">
+      <a:schemeClr val="lt1"/>
+    </dgm:linClrLst>
+    <dgm:effectClrLst/>
+    <dgm:txLinClrLst/>
+    <dgm:txFillClrLst/>
+    <dgm:txEffectClrLst/>
+  </dgm:styleLbl>
+  <dgm:styleLbl name="node4">
+    <dgm:fillClrLst meth="repeat">
+      <a:schemeClr val="accent1"/>
+    </dgm:fillClrLst>
+    <dgm:linClrLst meth="repeat">
+      <a:schemeClr val="lt1"/>
+    </dgm:linClrLst>
+    <dgm:effectClrLst/>
+    <dgm:txLinClrLst/>
+    <dgm:txFillClrLst/>
+    <dgm:txEffectClrLst/>
+  </dgm:styleLbl>
+  <dgm:styleLbl name="fgImgPlace1">
+    <dgm:fillClrLst meth="repeat">
+      <a:schemeClr val="accent1">
+        <a:tint val="50000"/>
+      </a:schemeClr>
+    </dgm:fillClrLst>
+    <dgm:linClrLst meth="repeat">
+      <a:schemeClr val="lt1"/>
+    </dgm:linClrLst>
+    <dgm:effectClrLst/>
+    <dgm:txLinClrLst/>
+    <dgm:txFillClrLst meth="repeat">
+      <a:schemeClr val="lt1"/>
+    </dgm:txFillClrLst>
+    <dgm:txEffectClrLst/>
+  </dgm:styleLbl>
+  <dgm:styleLbl name="alignImgPlace1">
+    <dgm:fillClrLst meth="repeat">
+      <a:schemeClr val="accent1">
+        <a:tint val="50000"/>
+      </a:schemeClr>
+    </dgm:fillClrLst>
+    <dgm:linClrLst meth="repeat">
+      <a:schemeClr val="lt1"/>
+    </dgm:linClrLst>
+    <dgm:effectClrLst/>
+    <dgm:txLinClrLst/>
+    <dgm:txFillClrLst meth="repeat">
+      <a:schemeClr val="lt1"/>
+    </dgm:txFillClrLst>
+    <dgm:txEffectClrLst/>
+  </dgm:styleLbl>
+  <dgm:styleLbl name="bgImgPlace1">
+    <dgm:fillClrLst meth="repeat">
+      <a:schemeClr val="accent1">
+        <a:tint val="50000"/>
+      </a:schemeClr>
+    </dgm:fillClrLst>
+    <dgm:linClrLst meth="repeat">
+      <a:schemeClr val="lt1"/>
+    </dgm:linClrLst>
+    <dgm:effectClrLst/>
+    <dgm:txLinClrLst/>
+    <dgm:txFillClrLst meth="repeat">
+      <a:schemeClr val="lt1"/>
+    </dgm:txFillClrLst>
+    <dgm:txEffectClrLst/>
+  </dgm:styleLbl>
+  <dgm:styleLbl name="sibTrans2D1">
+    <dgm:fillClrLst meth="repeat">
+      <a:schemeClr val="accent1">
+        <a:tint val="60000"/>
+      </a:schemeClr>
+    </dgm:fillClrLst>
+    <dgm:linClrLst meth="repeat">
+      <a:schemeClr val="accent1">
+        <a:tint val="60000"/>
+      </a:schemeClr>
+    </dgm:linClrLst>
+    <dgm:effectClrLst/>
+    <dgm:txLinClrLst/>
+    <dgm:txFillClrLst/>
+    <dgm:txEffectClrLst/>
+  </dgm:styleLbl>
+  <dgm:styleLbl name="fgSibTrans2D1">
+    <dgm:fillClrLst meth="repeat">
+      <a:schemeClr val="accent1">
+        <a:tint val="60000"/>
+      </a:schemeClr>
+    </dgm:fillClrLst>
+    <dgm:linClrLst meth="repeat">
+      <a:schemeClr val="accent1">
+        <a:tint val="60000"/>
+      </a:schemeClr>
+    </dgm:linClrLst>
+    <dgm:effectClrLst/>
+    <dgm:txLinClrLst/>
+    <dgm:txFillClrLst/>
+    <dgm:txEffectClrLst/>
+  </dgm:styleLbl>
+  <dgm:styleLbl name="bgSibTrans2D1">
+    <dgm:fillClrLst meth="repeat">
+      <a:schemeClr val="accent1">
+        <a:tint val="60000"/>
+      </a:schemeClr>
+    </dgm:fillClrLst>
+    <dgm:linClrLst meth="repeat">
+      <a:schemeClr val="accent1">
+        <a:tint val="60000"/>
+      </a:schemeClr>
+    </dgm:linClrLst>
+    <dgm:effectClrLst/>
+    <dgm:txLinClrLst/>
+    <dgm:txFillClrLst/>
+    <dgm:txEffectClrLst/>
+  </dgm:styleLbl>
+  <dgm:styleLbl name="sibTrans1D1">
+    <dgm:fillClrLst meth="repeat">
+      <a:schemeClr val="accent1"/>
+    </dgm:fillClrLst>
+    <dgm:linClrLst meth="repeat">
+      <a:schemeClr val="accent1"/>
+    </dgm:linClrLst>
+    <dgm:effectClrLst/>
+    <dgm:txLinClrLst/>
+    <dgm:txFillClrLst meth="repeat">
+      <a:schemeClr val="tx1"/>
+    </dgm:txFillClrLst>
+    <dgm:txEffectClrLst/>
+  </dgm:styleLbl>
+  <dgm:styleLbl name="callout">
+    <dgm:fillClrLst meth="repeat">
+      <a:schemeClr val="accent1"/>
+    </dgm:fillClrLst>
+    <dgm:linClrLst meth="repeat">
+      <a:schemeClr val="accent1">
+        <a:tint val="50000"/>
+      </a:schemeClr>
+    </dgm:linClrLst>
+    <dgm:effectClrLst/>
+    <dgm:txLinClrLst/>
+    <dgm:txFillClrLst meth="repeat">
+      <a:schemeClr val="tx1"/>
+    </dgm:txFillClrLst>
+    <dgm:txEffectClrLst/>
+  </dgm:styleLbl>
+  <dgm:styleLbl name="asst0">
+    <dgm:fillClrLst meth="repeat">
+      <a:schemeClr val="accent1"/>
+    </dgm:fillClrLst>
+    <dgm:linClrLst meth="repeat">
+      <a:schemeClr val="lt1"/>
+    </dgm:linClrLst>
+    <dgm:effectClrLst/>
+    <dgm:txLinClrLst/>
+    <dgm:txFillClrLst/>
+    <dgm:txEffectClrLst/>
+  </dgm:styleLbl>
+  <dgm:styleLbl name="asst1">
+    <dgm:fillClrLst meth="repeat">
+      <a:schemeClr val="accent1"/>
+    </dgm:fillClrLst>
+    <dgm:linClrLst meth="repeat">
+      <a:schemeClr val="lt1"/>
+    </dgm:linClrLst>
+    <dgm:effectClrLst/>
+    <dgm:txLinClrLst/>
+    <dgm:txFillClrLst/>
+    <dgm:txEffectClrLst/>
+  </dgm:styleLbl>
+  <dgm:styleLbl name="asst2">
+    <dgm:fillClrLst meth="repeat">
+      <a:schemeClr val="accent1"/>
+    </dgm:fillClrLst>
+    <dgm:linClrLst meth="repeat">
+      <a:schemeClr val="lt1"/>
+    </dgm:linClrLst>
+    <dgm:effectClrLst/>
+    <dgm:txLinClrLst/>
+    <dgm:txFillClrLst/>
+    <dgm:txEffectClrLst/>
+  </dgm:styleLbl>
+  <dgm:styleLbl name="asst3">
+    <dgm:fillClrLst meth="repeat">
+      <a:schemeClr val="accent1"/>
+    </dgm:fillClrLst>
+    <dgm:linClrLst meth="repeat">
+      <a:schemeClr val="lt1"/>
+    </dgm:linClrLst>
+    <dgm:effectClrLst/>
+    <dgm:txLinClrLst/>
+    <dgm:txFillClrLst/>
+    <dgm:txEffectClrLst/>
+  </dgm:styleLbl>
+  <dgm:styleLbl name="asst4">
+    <dgm:fillClrLst meth="repeat">
+      <a:schemeClr val="accent1"/>
+    </dgm:fillClrLst>
+    <dgm:linClrLst meth="repeat">
+      <a:schemeClr val="lt1"/>
+    </dgm:linClrLst>
+    <dgm:effectClrLst/>
+    <dgm:txLinClrLst/>
+    <dgm:txFillClrLst/>
+    <dgm:txEffectClrLst/>
+  </dgm:styleLbl>
+  <dgm:styleLbl name="parChTrans2D1">
+    <dgm:fillClrLst meth="repeat">
+      <a:schemeClr val="accent1">
+        <a:tint val="60000"/>
+      </a:schemeClr>
+    </dgm:fillClrLst>
+    <dgm:linClrLst meth="repeat">
+      <a:schemeClr val="accent1">
+        <a:tint val="60000"/>
+      </a:schemeClr>
+    </dgm:linClrLst>
+    <dgm:effectClrLst/>
+    <dgm:txLinClrLst/>
+    <dgm:txFillClrLst meth="repeat">
+      <a:schemeClr val="lt1"/>
+    </dgm:txFillClrLst>
+    <dgm:txEffectClrLst/>
+  </dgm:styleLbl>
+  <dgm:styleLbl name="parChTrans2D2">
+    <dgm:fillClrLst meth="repeat">
+      <a:schemeClr val="accent1"/>
+    </dgm:fillClrLst>
+    <dgm:linClrLst meth="repeat">
+      <a:schemeClr val="accent1"/>
+    </dgm:linClrLst>
+    <dgm:effectClrLst/>
+    <dgm:txLinClrLst/>
+    <dgm:txFillClrLst meth="repeat">
+      <a:schemeClr val="lt1"/>
+    </dgm:txFillClrLst>
+    <dgm:txEffectClrLst/>
+  </dgm:styleLbl>
+  <dgm:styleLbl name="parChTrans2D3">
+    <dgm:fillClrLst meth="repeat">
+      <a:schemeClr val="accent1"/>
+    </dgm:fillClrLst>
+    <dgm:linClrLst meth="repeat">
+      <a:schemeClr val="accent1"/>
+    </dgm:linClrLst>
+    <dgm:effectClrLst/>
+    <dgm:txLinClrLst/>
+    <dgm:txFillClrLst meth="repeat">
+      <a:schemeClr val="lt1"/>
+    </dgm:txFillClrLst>
+    <dgm:txEffectClrLst/>
+  </dgm:styleLbl>
+  <dgm:styleLbl name="parChTrans2D4">
+    <dgm:fillClrLst meth="repeat">
+      <a:schemeClr val="accent1"/>
+    </dgm:fillClrLst>
+    <dgm:linClrLst meth="repeat">
+      <a:schemeClr val="accent1"/>
+    </dgm:linClrLst>
+    <dgm:effectClrLst/>
+    <dgm:txLinClrLst/>
+    <dgm:txFillClrLst meth="repeat">
+      <a:schemeClr val="lt1"/>
+    </dgm:txFillClrLst>
+    <dgm:txEffectClrLst/>
+  </dgm:styleLbl>
+  <dgm:styleLbl name="parChTrans1D1">
+    <dgm:fillClrLst meth="repeat">
+      <a:schemeClr val="accent1"/>
+    </dgm:fillClrLst>
+    <dgm:linClrLst meth="repeat">
+      <a:schemeClr val="accent1">
+        <a:shade val="60000"/>
+      </a:schemeClr>
+    </dgm:linClrLst>
+    <dgm:effectClrLst/>
+    <dgm:txLinClrLst/>
+    <dgm:txFillClrLst meth="repeat">
+      <a:schemeClr val="tx1"/>
+    </dgm:txFillClrLst>
+    <dgm:txEffectClrLst/>
+  </dgm:styleLbl>
+  <dgm:styleLbl name="parChTrans1D2">
+    <dgm:fillClrLst meth="repeat">
+      <a:schemeClr val="accent1"/>
+    </dgm:fillClrLst>
+    <dgm:linClrLst meth="repeat">
+      <a:schemeClr val="accent1">
+        <a:shade val="60000"/>
+      </a:schemeClr>
+    </dgm:linClrLst>
+    <dgm:effectClrLst/>
+    <dgm:txLinClrLst/>
+    <dgm:txFillClrLst meth="repeat">
+      <a:schemeClr val="tx1"/>
+    </dgm:txFillClrLst>
+    <dgm:txEffectClrLst/>
+  </dgm:styleLbl>
+  <dgm:styleLbl name="parChTrans1D3">
+    <dgm:fillClrLst meth="repeat">
+      <a:schemeClr val="accent1"/>
+    </dgm:fillClrLst>
+    <dgm:linClrLst meth="repeat">
+      <a:schemeClr val="accent1">
+        <a:shade val="80000"/>
+      </a:schemeClr>
+    </dgm:linClrLst>
+    <dgm:effectClrLst/>
+    <dgm:txLinClrLst/>
+    <dgm:txFillClrLst meth="repeat">
+      <a:schemeClr val="tx1"/>
+    </dgm:txFillClrLst>
+    <dgm:txEffectClrLst/>
+  </dgm:styleLbl>
+  <dgm:styleLbl name="parChTrans1D4">
+    <dgm:fillClrLst meth="repeat">
+      <a:schemeClr val="accent1"/>
+    </dgm:fillClrLst>
+    <dgm:linClrLst meth="repeat">
+      <a:schemeClr val="accent1">
+        <a:shade val="80000"/>
+      </a:schemeClr>
+    </dgm:linClrLst>
+    <dgm:effectClrLst/>
+    <dgm:txLinClrLst/>
+    <dgm:txFillClrLst meth="repeat">
+      <a:schemeClr val="tx1"/>
+    </dgm:txFillClrLst>
+    <dgm:txEffectClrLst/>
+  </dgm:styleLbl>
+  <dgm:styleLbl name="fgAcc1">
+    <dgm:fillClrLst meth="repeat">
+      <a:schemeClr val="lt1">
+        <a:alpha val="90000"/>
+      </a:schemeClr>
+    </dgm:fillClrLst>
+    <dgm:linClrLst meth="repeat">
+      <a:schemeClr val="accent1"/>
+    </dgm:linClrLst>
+    <dgm:effectClrLst/>
+    <dgm:txLinClrLst/>
+    <dgm:txFillClrLst meth="repeat">
+      <a:schemeClr val="dk1"/>
+    </dgm:txFillClrLst>
+    <dgm:txEffectClrLst/>
+  </dgm:styleLbl>
+  <dgm:styleLbl name="conFgAcc1">
+    <dgm:fillClrLst meth="repeat">
+      <a:schemeClr val="lt1">
+        <a:alpha val="90000"/>
+      </a:schemeClr>
+    </dgm:fillClrLst>
+    <dgm:linClrLst meth="repeat">
+      <a:schemeClr val="accent1"/>
+    </dgm:linClrLst>
+    <dgm:effectClrLst/>
+    <dgm:txLinClrLst/>
+    <dgm:txFillClrLst meth="repeat">
+      <a:schemeClr val="dk1"/>
+    </dgm:txFillClrLst>
+    <dgm:txEffectClrLst/>
+  </dgm:styleLbl>
+  <dgm:styleLbl name="alignAcc1">
+    <dgm:fillClrLst meth="repeat">
+      <a:schemeClr val="lt1">
+        <a:alpha val="90000"/>
+      </a:schemeClr>
+    </dgm:fillClrLst>
+    <dgm:linClrLst meth="repeat">
+      <a:schemeClr val="accent1"/>
+    </dgm:linClrLst>
+    <dgm:effectClrLst/>
+    <dgm:txLinClrLst/>
+    <dgm:txFillClrLst meth="repeat">
+      <a:schemeClr val="dk1"/>
+    </dgm:txFillClrLst>
+    <dgm:txEffectClrLst/>
+  </dgm:styleLbl>
+  <dgm:styleLbl name="trAlignAcc1">
+    <dgm:fillClrLst meth="repeat">
+      <a:schemeClr val="lt1">
+        <a:alpha val="40000"/>
+      </a:schemeClr>
+    </dgm:fillClrLst>
+    <dgm:linClrLst meth="repeat">
+      <a:schemeClr val="accent1"/>
+    </dgm:linClrLst>
+    <dgm:effectClrLst/>
+    <dgm:txLinClrLst/>
+    <dgm:txFillClrLst meth="repeat">
+      <a:schemeClr val="dk1"/>
+    </dgm:txFillClrLst>
+    <dgm:txEffectClrLst/>
+  </dgm:styleLbl>
+  <dgm:styleLbl name="bgAcc1">
+    <dgm:fillClrLst meth="repeat">
+      <a:schemeClr val="lt1">
+        <a:alpha val="90000"/>
+      </a:schemeClr>
+    </dgm:fillClrLst>
+    <dgm:linClrLst meth="repeat">
+      <a:schemeClr val="accent1"/>
+    </dgm:linClrLst>
+    <dgm:effectClrLst/>
+    <dgm:txLinClrLst/>
+    <dgm:txFillClrLst meth="repeat">
+      <a:schemeClr val="dk1"/>
+    </dgm:txFillClrLst>
+    <dgm:txEffectClrLst/>
+  </dgm:styleLbl>
+  <dgm:styleLbl name="solidFgAcc1">
+    <dgm:fillClrLst meth="repeat">
+      <a:schemeClr val="lt1"/>
+    </dgm:fillClrLst>
+    <dgm:linClrLst meth="repeat">
+      <a:schemeClr val="accent1"/>
+    </dgm:linClrLst>
+    <dgm:effectClrLst/>
+    <dgm:txLinClrLst/>
+    <dgm:txFillClrLst meth="repeat">
+      <a:schemeClr val="dk1"/>
+    </dgm:txFillClrLst>
+    <dgm:txEffectClrLst/>
+  </dgm:styleLbl>
+  <dgm:styleLbl name="solidAlignAcc1">
+    <dgm:fillClrLst meth="repeat">
+      <a:schemeClr val="lt1"/>
+    </dgm:fillClrLst>
+    <dgm:linClrLst meth="repeat">
+      <a:schemeClr val="accent1"/>
+    </dgm:linClrLst>
+    <dgm:effectClrLst/>
+    <dgm:txLinClrLst/>
+    <dgm:txFillClrLst meth="repeat">
+      <a:schemeClr val="dk1"/>
+    </dgm:txFillClrLst>
+    <dgm:txEffectClrLst/>
+  </dgm:styleLbl>
+  <dgm:styleLbl name="solidBgAcc1">
+    <dgm:fillClrLst meth="repeat">
+      <a:schemeClr val="lt1"/>
+    </dgm:fillClrLst>
+    <dgm:linClrLst meth="repeat">
+      <a:schemeClr val="accent1"/>
+    </dgm:linClrLst>
+    <dgm:effectClrLst/>
+    <dgm:txLinClrLst/>
+    <dgm:txFillClrLst meth="repeat">
+      <a:schemeClr val="dk1"/>
+    </dgm:txFillClrLst>
+    <dgm:txEffectClrLst/>
+  </dgm:styleLbl>
+  <dgm:styleLbl name="fgAccFollowNode1">
+    <dgm:fillClrLst meth="repeat">
+      <a:schemeClr val="accent1">
+        <a:alpha val="90000"/>
+        <a:tint val="40000"/>
+      </a:schemeClr>
+    </dgm:fillClrLst>
+    <dgm:linClrLst meth="repeat">
+      <a:schemeClr val="accent1">
+        <a:alpha val="90000"/>
+        <a:tint val="40000"/>
+      </a:schemeClr>
+    </dgm:linClrLst>
+    <dgm:effectClrLst/>
+    <dgm:txLinClrLst/>
+    <dgm:txFillClrLst meth="repeat">
+      <a:schemeClr val="dk1"/>
+    </dgm:txFillClrLst>
+    <dgm:txEffectClrLst/>
+  </dgm:styleLbl>
+  <dgm:styleLbl name="alignAccFollowNode1">
+    <dgm:fillClrLst meth="repeat">
+      <a:schemeClr val="accent1">
+        <a:alpha val="90000"/>
+        <a:tint val="40000"/>
+      </a:schemeClr>
+    </dgm:fillClrLst>
+    <dgm:linClrLst meth="repeat">
+      <a:schemeClr val="accent1">
+        <a:alpha val="90000"/>
+        <a:tint val="40000"/>
+      </a:schemeClr>
+    </dgm:linClrLst>
+    <dgm:effectClrLst/>
+    <dgm:txLinClrLst/>
+    <dgm:txFillClrLst meth="repeat">
+      <a:schemeClr val="dk1"/>
+    </dgm:txFillClrLst>
+    <dgm:txEffectClrLst/>
+  </dgm:styleLbl>
+  <dgm:styleLbl name="bgAccFollowNode1">
+    <dgm:fillClrLst meth="repeat">
+      <a:schemeClr val="accent1">
+        <a:alpha val="90000"/>
+        <a:tint val="40000"/>
+      </a:schemeClr>
+    </dgm:fillClrLst>
+    <dgm:linClrLst meth="repeat">
+      <a:schemeClr val="accent1">
+        <a:alpha val="90000"/>
+        <a:tint val="40000"/>
+      </a:schemeClr>
+    </dgm:linClrLst>
+    <dgm:effectClrLst/>
+    <dgm:txLinClrLst/>
+    <dgm:txFillClrLst meth="repeat">
+      <a:schemeClr val="dk1"/>
+    </dgm:txFillClrLst>
+    <dgm:txEffectClrLst/>
+  </dgm:styleLbl>
+  <dgm:styleLbl name="fgAcc0">
+    <dgm:fillClrLst meth="repeat">
+      <a:schemeClr val="lt1">
+        <a:alpha val="90000"/>
+      </a:schemeClr>
+    </dgm:fillClrLst>
+    <dgm:linClrLst meth="repeat">
+      <a:schemeClr val="accent1"/>
+    </dgm:linClrLst>
+    <dgm:effectClrLst/>
+    <dgm:txLinClrLst/>
+    <dgm:txFillClrLst meth="repeat">
+      <a:schemeClr val="dk1"/>
+    </dgm:txFillClrLst>
+    <dgm:txEffectClrLst/>
+  </dgm:styleLbl>
+  <dgm:styleLbl name="fgAcc2">
+    <dgm:fillClrLst meth="repeat">
+      <a:schemeClr val="lt1">
+        <a:alpha val="90000"/>
+      </a:schemeClr>
+    </dgm:fillClrLst>
+    <dgm:linClrLst meth="repeat">
+      <a:schemeClr val="accent1"/>
+    </dgm:linClrLst>
+    <dgm:effectClrLst/>
+    <dgm:txLinClrLst/>
+    <dgm:txFillClrLst meth="repeat">
+      <a:schemeClr val="dk1"/>
+    </dgm:txFillClrLst>
+    <dgm:txEffectClrLst/>
+  </dgm:styleLbl>
+  <dgm:styleLbl name="fgAcc3">
+    <dgm:fillClrLst meth="repeat">
+      <a:schemeClr val="lt1">
+        <a:alpha val="90000"/>
+      </a:schemeClr>
+    </dgm:fillClrLst>
+    <dgm:linClrLst meth="repeat">
+      <a:schemeClr val="accent1"/>
+    </dgm:linClrLst>
+    <dgm:effectClrLst/>
+    <dgm:txLinClrLst/>
+    <dgm:txFillClrLst meth="repeat">
+      <a:schemeClr val="dk1"/>
+    </dgm:txFillClrLst>
+    <dgm:txEffectClrLst/>
+  </dgm:styleLbl>
+  <dgm:styleLbl name="fgAcc4">
+    <dgm:fillClrLst meth="repeat">
+      <a:schemeClr val="lt1">
+        <a:alpha val="90000"/>
+      </a:schemeClr>
+    </dgm:fillClrLst>
+    <dgm:linClrLst meth="repeat">
+      <a:schemeClr val="accent1"/>
+    </dgm:linClrLst>
+    <dgm:effectClrLst/>
+    <dgm:txLinClrLst/>
+    <dgm:txFillClrLst meth="repeat">
+      <a:schemeClr val="dk1"/>
+    </dgm:txFillClrLst>
+    <dgm:txEffectClrLst/>
+  </dgm:styleLbl>
+  <dgm:styleLbl name="bgShp">
+    <dgm:fillClrLst meth="repeat">
+      <a:schemeClr val="accent1">
+        <a:tint val="40000"/>
+      </a:schemeClr>
+    </dgm:fillClrLst>
+    <dgm:linClrLst meth="repeat">
+      <a:schemeClr val="accent1"/>
+    </dgm:linClrLst>
+    <dgm:effectClrLst/>
+    <dgm:txLinClrLst/>
+    <dgm:txFillClrLst meth="repeat">
+      <a:schemeClr val="dk1"/>
+    </dgm:txFillClrLst>
+    <dgm:txEffectClrLst/>
+  </dgm:styleLbl>
+  <dgm:styleLbl name="dkBgShp">
+    <dgm:fillClrLst meth="repeat">
+      <a:schemeClr val="accent1">
+        <a:shade val="80000"/>
+      </a:schemeClr>
+    </dgm:fillClrLst>
+    <dgm:linClrLst meth="repeat">
+      <a:schemeClr val="accent1"/>
+    </dgm:linClrLst>
+    <dgm:effectClrLst/>
+    <dgm:txLinClrLst/>
+    <dgm:txFillClrLst meth="repeat">
+      <a:schemeClr val="lt1"/>
+    </dgm:txFillClrLst>
+    <dgm:txEffectClrLst/>
+  </dgm:styleLbl>
+  <dgm:styleLbl name="trBgShp">
+    <dgm:fillClrLst meth="repeat">
+      <a:schemeClr val="accent1">
+        <a:tint val="50000"/>
+        <a:alpha val="40000"/>
+      </a:schemeClr>
+    </dgm:fillClrLst>
+    <dgm:linClrLst meth="repeat">
+      <a:schemeClr val="accent1"/>
+    </dgm:linClrLst>
+    <dgm:effectClrLst/>
+    <dgm:txLinClrLst/>
+    <dgm:txFillClrLst meth="repeat">
+      <a:schemeClr val="lt1"/>
+    </dgm:txFillClrLst>
+    <dgm:txEffectClrLst/>
+  </dgm:styleLbl>
+  <dgm:styleLbl name="fgShp">
+    <dgm:fillClrLst meth="repeat">
+      <a:schemeClr val="accent1">
+        <a:tint val="60000"/>
+      </a:schemeClr>
+    </dgm:fillClrLst>
+    <dgm:linClrLst meth="repeat">
+      <a:schemeClr val="lt1"/>
+    </dgm:linClrLst>
+    <dgm:effectClrLst/>
+    <dgm:txLinClrLst/>
+    <dgm:txFillClrLst meth="repeat">
+      <a:schemeClr val="dk1"/>
+    </dgm:txFillClrLst>
+    <dgm:txEffectClrLst/>
+  </dgm:styleLbl>
+  <dgm:styleLbl name="revTx">
+    <dgm:fillClrLst meth="repeat">
+      <a:schemeClr val="lt1">
+        <a:alpha val="0"/>
+      </a:schemeClr>
+    </dgm:fillClrLst>
+    <dgm:linClrLst meth="repeat">
+      <a:schemeClr val="dk1">
+        <a:alpha val="0"/>
+      </a:schemeClr>
+    </dgm:linClrLst>
+    <dgm:effectClrLst/>
+    <dgm:txLinClrLst/>
+    <dgm:txFillClrLst meth="repeat">
+      <a:schemeClr val="tx1"/>
+    </dgm:txFillClrLst>
+    <dgm:txEffectClrLst/>
+  </dgm:styleLbl>
+</dgm:colorsDef>
+</file>
+
 <file path=ppt/diagrams/data1.xml><?xml version="1.0" encoding="utf-8"?>
 <dgm:dataModel xmlns:dgm="http://schemas.openxmlformats.org/drawingml/2006/diagram" xmlns:a="http://schemas.openxmlformats.org/drawingml/2006/main">
   <dgm:ptLst>
@@ -2317,6 +3064,545 @@
     <dgm:cxn modelId="{CE7497E6-C882-40FF-BC6A-7AD0AC2509D7}" type="presParOf" srcId="{0000628D-8A2D-48D7-9085-70D1F728F4C4}" destId="{2A7F61A1-A4F5-4A97-97F3-F8324002EF0E}" srcOrd="2" destOrd="0" presId="urn:microsoft.com/office/officeart/2005/8/layout/architecture"/>
     <dgm:cxn modelId="{C0A7C492-2DDD-4251-9E86-DD82F7E39086}" type="presParOf" srcId="{2A7F61A1-A4F5-4A97-97F3-F8324002EF0E}" destId="{43F27BF5-86E5-4ACF-80D4-0D27A19D036D}" srcOrd="0" destOrd="0" presId="urn:microsoft.com/office/officeart/2005/8/layout/architecture"/>
     <dgm:cxn modelId="{68A5E0CD-361E-42C3-851C-FEAB7F13E05C}" type="presParOf" srcId="{2A7F61A1-A4F5-4A97-97F3-F8324002EF0E}" destId="{9B3E6643-D5BB-488E-B175-E0EEC6C0CC7D}" srcOrd="1" destOrd="0" presId="urn:microsoft.com/office/officeart/2005/8/layout/architecture"/>
+  </dgm:cxnLst>
+  <dgm:bg/>
+  <dgm:whole/>
+  <dgm:extLst>
+    <a:ext uri="http://schemas.microsoft.com/office/drawing/2008/diagram">
+      <dsp:dataModelExt xmlns:dsp="http://schemas.microsoft.com/office/drawing/2008/diagram" relId="rId6" minVer="http://schemas.openxmlformats.org/drawingml/2006/diagram"/>
+    </a:ext>
+  </dgm:extLst>
+</dgm:dataModel>
+</file>
+
+<file path=ppt/diagrams/data2.xml><?xml version="1.0" encoding="utf-8"?>
+<dgm:dataModel xmlns:dgm="http://schemas.openxmlformats.org/drawingml/2006/diagram" xmlns:a="http://schemas.openxmlformats.org/drawingml/2006/main">
+  <dgm:ptLst>
+    <dgm:pt modelId="{172967EE-C897-4756-A188-9F76602F5259}" type="doc">
+      <dgm:prSet loTypeId="urn:microsoft.com/office/officeart/2005/8/layout/hierarchy4" loCatId="hierarchy" qsTypeId="urn:microsoft.com/office/officeart/2005/8/quickstyle/simple1" qsCatId="simple" csTypeId="urn:microsoft.com/office/officeart/2005/8/colors/accent1_2" csCatId="accent1" phldr="1"/>
+      <dgm:spPr/>
+      <dgm:t>
+        <a:bodyPr/>
+        <a:lstStyle/>
+        <a:p>
+          <a:endParaRPr lang="en-CA"/>
+        </a:p>
+      </dgm:t>
+    </dgm:pt>
+    <dgm:pt modelId="{709AEA1E-5B26-4073-97C6-D151454E7A6F}">
+      <dgm:prSet phldrT="[Text]"/>
+      <dgm:spPr/>
+      <dgm:t>
+        <a:bodyPr/>
+        <a:lstStyle/>
+        <a:p>
+          <a:r>
+            <a:rPr lang="en-CA" dirty="0"/>
+            <a:t>Browser</a:t>
+          </a:r>
+        </a:p>
+      </dgm:t>
+    </dgm:pt>
+    <dgm:pt modelId="{1B00027B-2394-47EE-82B8-4FADAF1246EF}" type="parTrans" cxnId="{ABE2D179-B747-438A-8DD9-1EC2D409CAF8}">
+      <dgm:prSet/>
+      <dgm:spPr/>
+      <dgm:t>
+        <a:bodyPr/>
+        <a:lstStyle/>
+        <a:p>
+          <a:endParaRPr lang="en-CA"/>
+        </a:p>
+      </dgm:t>
+    </dgm:pt>
+    <dgm:pt modelId="{D08C2FE6-2492-4A05-A6BF-7668BAC86743}" type="sibTrans" cxnId="{ABE2D179-B747-438A-8DD9-1EC2D409CAF8}">
+      <dgm:prSet/>
+      <dgm:spPr/>
+      <dgm:t>
+        <a:bodyPr/>
+        <a:lstStyle/>
+        <a:p>
+          <a:endParaRPr lang="en-CA"/>
+        </a:p>
+      </dgm:t>
+    </dgm:pt>
+    <dgm:pt modelId="{8E643295-BA44-496D-81F1-22AD08BB7BE2}">
+      <dgm:prSet phldrT="[Text]"/>
+      <dgm:spPr/>
+      <dgm:t>
+        <a:bodyPr/>
+        <a:lstStyle/>
+        <a:p>
+          <a:r>
+            <a:rPr lang="en-CA" dirty="0"/>
+            <a:t>Backend1</a:t>
+          </a:r>
+        </a:p>
+      </dgm:t>
+    </dgm:pt>
+    <dgm:pt modelId="{E3C48F47-8736-48F2-A116-9B896DFBB41C}" type="parTrans" cxnId="{068AA221-3709-4AD8-88F2-4C7A9038AA42}">
+      <dgm:prSet/>
+      <dgm:spPr/>
+      <dgm:t>
+        <a:bodyPr/>
+        <a:lstStyle/>
+        <a:p>
+          <a:endParaRPr lang="en-CA"/>
+        </a:p>
+      </dgm:t>
+    </dgm:pt>
+    <dgm:pt modelId="{A3E6B778-A947-4BF5-90BE-9159A9E4A606}" type="sibTrans" cxnId="{068AA221-3709-4AD8-88F2-4C7A9038AA42}">
+      <dgm:prSet/>
+      <dgm:spPr/>
+      <dgm:t>
+        <a:bodyPr/>
+        <a:lstStyle/>
+        <a:p>
+          <a:endParaRPr lang="en-CA"/>
+        </a:p>
+      </dgm:t>
+    </dgm:pt>
+    <dgm:pt modelId="{B6CD8F8F-BA52-4583-9258-19C21300A629}">
+      <dgm:prSet phldrT="[Text]"/>
+      <dgm:spPr/>
+      <dgm:t>
+        <a:bodyPr/>
+        <a:lstStyle/>
+        <a:p>
+          <a:r>
+            <a:rPr lang="en-CA" dirty="0"/>
+            <a:t>Backend2</a:t>
+          </a:r>
+        </a:p>
+      </dgm:t>
+    </dgm:pt>
+    <dgm:pt modelId="{172ED792-F9F9-410B-8C6B-155566000F60}" type="parTrans" cxnId="{E1DF9E38-0B7E-443A-B907-AFDD0720C15B}">
+      <dgm:prSet/>
+      <dgm:spPr/>
+    </dgm:pt>
+    <dgm:pt modelId="{1F54B000-AAA9-4307-AB4F-8420C6B6FAE0}" type="sibTrans" cxnId="{E1DF9E38-0B7E-443A-B907-AFDD0720C15B}">
+      <dgm:prSet/>
+      <dgm:spPr/>
+    </dgm:pt>
+    <dgm:pt modelId="{BCB2ECA5-858F-4346-AE38-280FE9BB03AD}">
+      <dgm:prSet phldrT="[Text]"/>
+      <dgm:spPr/>
+      <dgm:t>
+        <a:bodyPr/>
+        <a:lstStyle/>
+        <a:p>
+          <a:r>
+            <a:rPr lang="en-CA" dirty="0"/>
+            <a:t>Backend3</a:t>
+          </a:r>
+        </a:p>
+      </dgm:t>
+    </dgm:pt>
+    <dgm:pt modelId="{82D30B57-9D36-44A8-9126-E51B9234F263}" type="parTrans" cxnId="{68148497-2DC4-4839-9A06-24D29EDC06B9}">
+      <dgm:prSet/>
+      <dgm:spPr/>
+    </dgm:pt>
+    <dgm:pt modelId="{5B52B4B3-3BE7-4D68-A3F9-8DAF9FD469FF}" type="sibTrans" cxnId="{68148497-2DC4-4839-9A06-24D29EDC06B9}">
+      <dgm:prSet/>
+      <dgm:spPr/>
+    </dgm:pt>
+    <dgm:pt modelId="{C96466FA-4D7C-41D5-8260-B045021B732D}">
+      <dgm:prSet phldrT="[Text]"/>
+      <dgm:spPr/>
+      <dgm:t>
+        <a:bodyPr/>
+        <a:lstStyle/>
+        <a:p>
+          <a:r>
+            <a:rPr lang="en-CA" dirty="0"/>
+            <a:t>User</a:t>
+          </a:r>
+        </a:p>
+      </dgm:t>
+    </dgm:pt>
+    <dgm:pt modelId="{03FBF7B4-6F5C-4FBF-8830-079F8667169C}" type="parTrans" cxnId="{4EB1F00A-A28E-4BD9-9419-A790B527202C}">
+      <dgm:prSet/>
+      <dgm:spPr/>
+    </dgm:pt>
+    <dgm:pt modelId="{393A881D-91B0-412C-BA72-A1A01E6E26C9}" type="sibTrans" cxnId="{4EB1F00A-A28E-4BD9-9419-A790B527202C}">
+      <dgm:prSet/>
+      <dgm:spPr/>
+    </dgm:pt>
+    <dgm:pt modelId="{315983D5-67D9-4C06-9034-89B5E85DAD1A}">
+      <dgm:prSet phldrT="[Text]"/>
+      <dgm:spPr/>
+      <dgm:t>
+        <a:bodyPr/>
+        <a:lstStyle/>
+        <a:p>
+          <a:r>
+            <a:rPr lang="en-CA" dirty="0"/>
+            <a:t>Backends</a:t>
+          </a:r>
+        </a:p>
+      </dgm:t>
+    </dgm:pt>
+    <dgm:pt modelId="{6D46B20A-2791-4EEF-B11F-CFDE022783BC}" type="parTrans" cxnId="{88B1AA05-7C6B-42C5-AD62-2A5072F73099}">
+      <dgm:prSet/>
+      <dgm:spPr/>
+    </dgm:pt>
+    <dgm:pt modelId="{294808F2-EC40-4243-A88A-4DE159F4420D}" type="sibTrans" cxnId="{88B1AA05-7C6B-42C5-AD62-2A5072F73099}">
+      <dgm:prSet/>
+      <dgm:spPr/>
+    </dgm:pt>
+    <dgm:pt modelId="{495D8C63-AE2D-40B5-900B-46FA443CB69B}">
+      <dgm:prSet phldrT="[Text]"/>
+      <dgm:spPr/>
+      <dgm:t>
+        <a:bodyPr/>
+        <a:lstStyle/>
+        <a:p>
+          <a:r>
+            <a:rPr lang="en-CA" dirty="0"/>
+            <a:t>Auth Token</a:t>
+          </a:r>
+        </a:p>
+      </dgm:t>
+    </dgm:pt>
+    <dgm:pt modelId="{110E367E-A558-4B94-B94B-DE61FA380F78}" type="parTrans" cxnId="{9889C9E4-EEA2-4CEE-9070-6BF7FAFA045C}">
+      <dgm:prSet/>
+      <dgm:spPr/>
+    </dgm:pt>
+    <dgm:pt modelId="{712EDDD6-C5BE-4465-A145-16FE9CF00249}" type="sibTrans" cxnId="{9889C9E4-EEA2-4CEE-9070-6BF7FAFA045C}">
+      <dgm:prSet/>
+      <dgm:spPr/>
+    </dgm:pt>
+    <dgm:pt modelId="{B65D379A-71AC-452E-BA40-ED5188D60209}">
+      <dgm:prSet phldrT="[Text]"/>
+      <dgm:spPr/>
+      <dgm:t>
+        <a:bodyPr/>
+        <a:lstStyle/>
+        <a:p>
+          <a:r>
+            <a:rPr lang="en-CA" dirty="0"/>
+            <a:t>User</a:t>
+          </a:r>
+        </a:p>
+      </dgm:t>
+    </dgm:pt>
+    <dgm:pt modelId="{3EB6AEBE-1113-4CB6-B10E-A68A8486ADBA}" type="parTrans" cxnId="{E8ACAC19-ABBD-4DE0-B840-EAFC217D7091}">
+      <dgm:prSet/>
+      <dgm:spPr/>
+      <dgm:t>
+        <a:bodyPr/>
+        <a:lstStyle/>
+        <a:p>
+          <a:endParaRPr lang="en-CA"/>
+        </a:p>
+      </dgm:t>
+    </dgm:pt>
+    <dgm:pt modelId="{4049AE7E-601B-4DE1-9744-73CE9B52DA2F}" type="sibTrans" cxnId="{E8ACAC19-ABBD-4DE0-B840-EAFC217D7091}">
+      <dgm:prSet/>
+      <dgm:spPr/>
+      <dgm:t>
+        <a:bodyPr/>
+        <a:lstStyle/>
+        <a:p>
+          <a:endParaRPr lang="en-CA"/>
+        </a:p>
+      </dgm:t>
+    </dgm:pt>
+    <dgm:pt modelId="{514D326A-DE42-4235-9FB4-58F290A628FB}">
+      <dgm:prSet phldrT="[Text]"/>
+      <dgm:spPr/>
+      <dgm:t>
+        <a:bodyPr/>
+        <a:lstStyle/>
+        <a:p>
+          <a:r>
+            <a:rPr lang="en-CA" dirty="0"/>
+            <a:t>Auth Token</a:t>
+          </a:r>
+        </a:p>
+      </dgm:t>
+    </dgm:pt>
+    <dgm:pt modelId="{B260C05C-7D52-4ED2-8054-DED2445209D6}" type="parTrans" cxnId="{38450190-0171-49B7-A6AC-F80E885B0BFD}">
+      <dgm:prSet/>
+      <dgm:spPr/>
+      <dgm:t>
+        <a:bodyPr/>
+        <a:lstStyle/>
+        <a:p>
+          <a:endParaRPr lang="en-CA"/>
+        </a:p>
+      </dgm:t>
+    </dgm:pt>
+    <dgm:pt modelId="{E275640F-0759-4FEB-A7A8-E9ECB0865D1A}" type="sibTrans" cxnId="{38450190-0171-49B7-A6AC-F80E885B0BFD}">
+      <dgm:prSet/>
+      <dgm:spPr/>
+      <dgm:t>
+        <a:bodyPr/>
+        <a:lstStyle/>
+        <a:p>
+          <a:endParaRPr lang="en-CA"/>
+        </a:p>
+      </dgm:t>
+    </dgm:pt>
+    <dgm:pt modelId="{BF87E022-002C-4323-A5A4-B07B82CF2C58}" type="pres">
+      <dgm:prSet presAssocID="{172967EE-C897-4756-A188-9F76602F5259}" presName="Name0" presStyleCnt="0">
+        <dgm:presLayoutVars>
+          <dgm:chPref val="1"/>
+          <dgm:dir/>
+          <dgm:animOne val="branch"/>
+          <dgm:animLvl val="lvl"/>
+          <dgm:resizeHandles/>
+        </dgm:presLayoutVars>
+      </dgm:prSet>
+      <dgm:spPr/>
+    </dgm:pt>
+    <dgm:pt modelId="{1D1738F1-7018-4CDE-BC4A-594F920D1EF8}" type="pres">
+      <dgm:prSet presAssocID="{709AEA1E-5B26-4073-97C6-D151454E7A6F}" presName="vertOne" presStyleCnt="0"/>
+      <dgm:spPr/>
+    </dgm:pt>
+    <dgm:pt modelId="{70B64D6A-10D3-4D65-8616-BB35B6274C0B}" type="pres">
+      <dgm:prSet presAssocID="{709AEA1E-5B26-4073-97C6-D151454E7A6F}" presName="txOne" presStyleLbl="node0" presStyleIdx="0" presStyleCnt="1">
+        <dgm:presLayoutVars>
+          <dgm:chPref val="3"/>
+        </dgm:presLayoutVars>
+      </dgm:prSet>
+      <dgm:spPr/>
+    </dgm:pt>
+    <dgm:pt modelId="{34875D5E-D560-40BD-88FB-7A6C563DA1DA}" type="pres">
+      <dgm:prSet presAssocID="{709AEA1E-5B26-4073-97C6-D151454E7A6F}" presName="parTransOne" presStyleCnt="0"/>
+      <dgm:spPr/>
+    </dgm:pt>
+    <dgm:pt modelId="{4197B6A4-C94A-497D-858B-095C8C14D61E}" type="pres">
+      <dgm:prSet presAssocID="{709AEA1E-5B26-4073-97C6-D151454E7A6F}" presName="horzOne" presStyleCnt="0"/>
+      <dgm:spPr/>
+    </dgm:pt>
+    <dgm:pt modelId="{E2AD26D5-DF87-428D-8024-3DA96DD2CDDE}" type="pres">
+      <dgm:prSet presAssocID="{315983D5-67D9-4C06-9034-89B5E85DAD1A}" presName="vertTwo" presStyleCnt="0"/>
+      <dgm:spPr/>
+    </dgm:pt>
+    <dgm:pt modelId="{45C53DC8-C85E-486A-BF1E-92666FB2440D}" type="pres">
+      <dgm:prSet presAssocID="{315983D5-67D9-4C06-9034-89B5E85DAD1A}" presName="txTwo" presStyleLbl="node2" presStyleIdx="0" presStyleCnt="1">
+        <dgm:presLayoutVars>
+          <dgm:chPref val="3"/>
+        </dgm:presLayoutVars>
+      </dgm:prSet>
+      <dgm:spPr/>
+    </dgm:pt>
+    <dgm:pt modelId="{5898800A-35EA-4C9F-B35B-3234F9531789}" type="pres">
+      <dgm:prSet presAssocID="{315983D5-67D9-4C06-9034-89B5E85DAD1A}" presName="parTransTwo" presStyleCnt="0"/>
+      <dgm:spPr/>
+    </dgm:pt>
+    <dgm:pt modelId="{480DDC56-400F-44FE-B8D7-B2A8D57D0A28}" type="pres">
+      <dgm:prSet presAssocID="{315983D5-67D9-4C06-9034-89B5E85DAD1A}" presName="horzTwo" presStyleCnt="0"/>
+      <dgm:spPr/>
+    </dgm:pt>
+    <dgm:pt modelId="{6CEBD633-E903-496B-B1AB-16903F692999}" type="pres">
+      <dgm:prSet presAssocID="{8E643295-BA44-496D-81F1-22AD08BB7BE2}" presName="vertThree" presStyleCnt="0"/>
+      <dgm:spPr/>
+    </dgm:pt>
+    <dgm:pt modelId="{1AA8F2F1-4261-47EE-9C94-B7B32C7938C9}" type="pres">
+      <dgm:prSet presAssocID="{8E643295-BA44-496D-81F1-22AD08BB7BE2}" presName="txThree" presStyleLbl="node3" presStyleIdx="0" presStyleCnt="3">
+        <dgm:presLayoutVars>
+          <dgm:chPref val="3"/>
+        </dgm:presLayoutVars>
+      </dgm:prSet>
+      <dgm:spPr/>
+    </dgm:pt>
+    <dgm:pt modelId="{F756E17E-B00B-4C44-AFF6-657A8BBB2ADE}" type="pres">
+      <dgm:prSet presAssocID="{8E643295-BA44-496D-81F1-22AD08BB7BE2}" presName="parTransThree" presStyleCnt="0"/>
+      <dgm:spPr/>
+    </dgm:pt>
+    <dgm:pt modelId="{294F003E-1148-4190-BA11-7124346558A2}" type="pres">
+      <dgm:prSet presAssocID="{8E643295-BA44-496D-81F1-22AD08BB7BE2}" presName="horzThree" presStyleCnt="0"/>
+      <dgm:spPr/>
+    </dgm:pt>
+    <dgm:pt modelId="{22F3D8C1-2C47-45DA-90BD-C320E1F6374D}" type="pres">
+      <dgm:prSet presAssocID="{C96466FA-4D7C-41D5-8260-B045021B732D}" presName="vertFour" presStyleCnt="0">
+        <dgm:presLayoutVars>
+          <dgm:chPref val="3"/>
+        </dgm:presLayoutVars>
+      </dgm:prSet>
+      <dgm:spPr/>
+    </dgm:pt>
+    <dgm:pt modelId="{3A3EEF32-BC99-4250-909D-8E9E0BAEC01F}" type="pres">
+      <dgm:prSet presAssocID="{C96466FA-4D7C-41D5-8260-B045021B732D}" presName="txFour" presStyleLbl="node4" presStyleIdx="0" presStyleCnt="4">
+        <dgm:presLayoutVars>
+          <dgm:chPref val="3"/>
+        </dgm:presLayoutVars>
+      </dgm:prSet>
+      <dgm:spPr/>
+    </dgm:pt>
+    <dgm:pt modelId="{1444A6D1-462D-4EBB-9A44-3462661CF099}" type="pres">
+      <dgm:prSet presAssocID="{C96466FA-4D7C-41D5-8260-B045021B732D}" presName="horzFour" presStyleCnt="0"/>
+      <dgm:spPr/>
+    </dgm:pt>
+    <dgm:pt modelId="{ADD5A52F-88F1-46D2-ABEB-7903D44014DD}" type="pres">
+      <dgm:prSet presAssocID="{393A881D-91B0-412C-BA72-A1A01E6E26C9}" presName="sibSpaceFour" presStyleCnt="0"/>
+      <dgm:spPr/>
+    </dgm:pt>
+    <dgm:pt modelId="{63F6F864-3E57-492D-9028-DA2F6079639A}" type="pres">
+      <dgm:prSet presAssocID="{495D8C63-AE2D-40B5-900B-46FA443CB69B}" presName="vertFour" presStyleCnt="0">
+        <dgm:presLayoutVars>
+          <dgm:chPref val="3"/>
+        </dgm:presLayoutVars>
+      </dgm:prSet>
+      <dgm:spPr/>
+    </dgm:pt>
+    <dgm:pt modelId="{89E119A1-CD64-41FB-B949-72C12ACD00DB}" type="pres">
+      <dgm:prSet presAssocID="{495D8C63-AE2D-40B5-900B-46FA443CB69B}" presName="txFour" presStyleLbl="node4" presStyleIdx="1" presStyleCnt="4">
+        <dgm:presLayoutVars>
+          <dgm:chPref val="3"/>
+        </dgm:presLayoutVars>
+      </dgm:prSet>
+      <dgm:spPr/>
+    </dgm:pt>
+    <dgm:pt modelId="{4205D810-9D6A-4C94-A949-0DB22C77649B}" type="pres">
+      <dgm:prSet presAssocID="{495D8C63-AE2D-40B5-900B-46FA443CB69B}" presName="horzFour" presStyleCnt="0"/>
+      <dgm:spPr/>
+    </dgm:pt>
+    <dgm:pt modelId="{C84E41B9-ED62-46E6-972D-963B3EFD52F7}" type="pres">
+      <dgm:prSet presAssocID="{A3E6B778-A947-4BF5-90BE-9159A9E4A606}" presName="sibSpaceThree" presStyleCnt="0"/>
+      <dgm:spPr/>
+    </dgm:pt>
+    <dgm:pt modelId="{9BEB7217-61B8-4355-ABCD-734D6BB9F243}" type="pres">
+      <dgm:prSet presAssocID="{B6CD8F8F-BA52-4583-9258-19C21300A629}" presName="vertThree" presStyleCnt="0"/>
+      <dgm:spPr/>
+    </dgm:pt>
+    <dgm:pt modelId="{8A2DBF15-8713-4185-96FD-EEB209A34292}" type="pres">
+      <dgm:prSet presAssocID="{B6CD8F8F-BA52-4583-9258-19C21300A629}" presName="txThree" presStyleLbl="node3" presStyleIdx="1" presStyleCnt="3">
+        <dgm:presLayoutVars>
+          <dgm:chPref val="3"/>
+        </dgm:presLayoutVars>
+      </dgm:prSet>
+      <dgm:spPr/>
+    </dgm:pt>
+    <dgm:pt modelId="{C3A8E6FE-BAF2-4360-978B-43F3EBAAEEDF}" type="pres">
+      <dgm:prSet presAssocID="{B6CD8F8F-BA52-4583-9258-19C21300A629}" presName="parTransThree" presStyleCnt="0"/>
+      <dgm:spPr/>
+    </dgm:pt>
+    <dgm:pt modelId="{084F2C56-E2EF-4819-86FE-6980932C3DC3}" type="pres">
+      <dgm:prSet presAssocID="{B6CD8F8F-BA52-4583-9258-19C21300A629}" presName="horzThree" presStyleCnt="0"/>
+      <dgm:spPr/>
+    </dgm:pt>
+    <dgm:pt modelId="{BB0503B4-C013-4519-BE97-20A6A27AAAD7}" type="pres">
+      <dgm:prSet presAssocID="{B65D379A-71AC-452E-BA40-ED5188D60209}" presName="vertFour" presStyleCnt="0">
+        <dgm:presLayoutVars>
+          <dgm:chPref val="3"/>
+        </dgm:presLayoutVars>
+      </dgm:prSet>
+      <dgm:spPr/>
+    </dgm:pt>
+    <dgm:pt modelId="{C4FB882A-8D60-4542-A14B-6AEB783C0ACF}" type="pres">
+      <dgm:prSet presAssocID="{B65D379A-71AC-452E-BA40-ED5188D60209}" presName="txFour" presStyleLbl="node4" presStyleIdx="2" presStyleCnt="4">
+        <dgm:presLayoutVars>
+          <dgm:chPref val="3"/>
+        </dgm:presLayoutVars>
+      </dgm:prSet>
+      <dgm:spPr/>
+    </dgm:pt>
+    <dgm:pt modelId="{AB630E9C-A0E8-4E25-8377-3A82E72FB0E0}" type="pres">
+      <dgm:prSet presAssocID="{B65D379A-71AC-452E-BA40-ED5188D60209}" presName="horzFour" presStyleCnt="0"/>
+      <dgm:spPr/>
+    </dgm:pt>
+    <dgm:pt modelId="{4D50367B-B7EF-4BD3-815A-1BA0FC551249}" type="pres">
+      <dgm:prSet presAssocID="{4049AE7E-601B-4DE1-9744-73CE9B52DA2F}" presName="sibSpaceFour" presStyleCnt="0"/>
+      <dgm:spPr/>
+    </dgm:pt>
+    <dgm:pt modelId="{4F06323D-C170-4FF0-950D-C2717E98F3B9}" type="pres">
+      <dgm:prSet presAssocID="{514D326A-DE42-4235-9FB4-58F290A628FB}" presName="vertFour" presStyleCnt="0">
+        <dgm:presLayoutVars>
+          <dgm:chPref val="3"/>
+        </dgm:presLayoutVars>
+      </dgm:prSet>
+      <dgm:spPr/>
+    </dgm:pt>
+    <dgm:pt modelId="{D4EF0E5B-8842-46EC-ACCA-3807AADFC40D}" type="pres">
+      <dgm:prSet presAssocID="{514D326A-DE42-4235-9FB4-58F290A628FB}" presName="txFour" presStyleLbl="node4" presStyleIdx="3" presStyleCnt="4">
+        <dgm:presLayoutVars>
+          <dgm:chPref val="3"/>
+        </dgm:presLayoutVars>
+      </dgm:prSet>
+      <dgm:spPr/>
+    </dgm:pt>
+    <dgm:pt modelId="{7497F510-F533-443F-B078-94B88FCC5A08}" type="pres">
+      <dgm:prSet presAssocID="{514D326A-DE42-4235-9FB4-58F290A628FB}" presName="horzFour" presStyleCnt="0"/>
+      <dgm:spPr/>
+    </dgm:pt>
+    <dgm:pt modelId="{64C4951B-4F3A-4ED2-A091-FFC88712A04D}" type="pres">
+      <dgm:prSet presAssocID="{1F54B000-AAA9-4307-AB4F-8420C6B6FAE0}" presName="sibSpaceThree" presStyleCnt="0"/>
+      <dgm:spPr/>
+    </dgm:pt>
+    <dgm:pt modelId="{FCF59A02-FDAA-4331-B967-A431269301EC}" type="pres">
+      <dgm:prSet presAssocID="{BCB2ECA5-858F-4346-AE38-280FE9BB03AD}" presName="vertThree" presStyleCnt="0"/>
+      <dgm:spPr/>
+    </dgm:pt>
+    <dgm:pt modelId="{519CF8ED-2222-4DF9-A0AA-3AC06A7AD00F}" type="pres">
+      <dgm:prSet presAssocID="{BCB2ECA5-858F-4346-AE38-280FE9BB03AD}" presName="txThree" presStyleLbl="node3" presStyleIdx="2" presStyleCnt="3">
+        <dgm:presLayoutVars>
+          <dgm:chPref val="3"/>
+        </dgm:presLayoutVars>
+      </dgm:prSet>
+      <dgm:spPr/>
+    </dgm:pt>
+    <dgm:pt modelId="{FB3B89C4-B5FC-456B-91C9-66C18E5CB9DB}" type="pres">
+      <dgm:prSet presAssocID="{BCB2ECA5-858F-4346-AE38-280FE9BB03AD}" presName="horzThree" presStyleCnt="0"/>
+      <dgm:spPr/>
+    </dgm:pt>
+  </dgm:ptLst>
+  <dgm:cxnLst>
+    <dgm:cxn modelId="{88B1AA05-7C6B-42C5-AD62-2A5072F73099}" srcId="{709AEA1E-5B26-4073-97C6-D151454E7A6F}" destId="{315983D5-67D9-4C06-9034-89B5E85DAD1A}" srcOrd="0" destOrd="0" parTransId="{6D46B20A-2791-4EEF-B11F-CFDE022783BC}" sibTransId="{294808F2-EC40-4243-A88A-4DE159F4420D}"/>
+    <dgm:cxn modelId="{E5A11D07-5AC3-4B0F-94F7-D7C58800C0B4}" type="presOf" srcId="{495D8C63-AE2D-40B5-900B-46FA443CB69B}" destId="{89E119A1-CD64-41FB-B949-72C12ACD00DB}" srcOrd="0" destOrd="0" presId="urn:microsoft.com/office/officeart/2005/8/layout/hierarchy4"/>
+    <dgm:cxn modelId="{BFB96B07-EDAE-4567-8D6D-205BA0638BF6}" type="presOf" srcId="{BCB2ECA5-858F-4346-AE38-280FE9BB03AD}" destId="{519CF8ED-2222-4DF9-A0AA-3AC06A7AD00F}" srcOrd="0" destOrd="0" presId="urn:microsoft.com/office/officeart/2005/8/layout/hierarchy4"/>
+    <dgm:cxn modelId="{4EB1F00A-A28E-4BD9-9419-A790B527202C}" srcId="{8E643295-BA44-496D-81F1-22AD08BB7BE2}" destId="{C96466FA-4D7C-41D5-8260-B045021B732D}" srcOrd="0" destOrd="0" parTransId="{03FBF7B4-6F5C-4FBF-8830-079F8667169C}" sibTransId="{393A881D-91B0-412C-BA72-A1A01E6E26C9}"/>
+    <dgm:cxn modelId="{E8ACAC19-ABBD-4DE0-B840-EAFC217D7091}" srcId="{B6CD8F8F-BA52-4583-9258-19C21300A629}" destId="{B65D379A-71AC-452E-BA40-ED5188D60209}" srcOrd="0" destOrd="0" parTransId="{3EB6AEBE-1113-4CB6-B10E-A68A8486ADBA}" sibTransId="{4049AE7E-601B-4DE1-9744-73CE9B52DA2F}"/>
+    <dgm:cxn modelId="{068AA221-3709-4AD8-88F2-4C7A9038AA42}" srcId="{315983D5-67D9-4C06-9034-89B5E85DAD1A}" destId="{8E643295-BA44-496D-81F1-22AD08BB7BE2}" srcOrd="0" destOrd="0" parTransId="{E3C48F47-8736-48F2-A116-9B896DFBB41C}" sibTransId="{A3E6B778-A947-4BF5-90BE-9159A9E4A606}"/>
+    <dgm:cxn modelId="{2C821237-7AF0-4B7B-87A9-4FB913FB66F8}" type="presOf" srcId="{8E643295-BA44-496D-81F1-22AD08BB7BE2}" destId="{1AA8F2F1-4261-47EE-9C94-B7B32C7938C9}" srcOrd="0" destOrd="0" presId="urn:microsoft.com/office/officeart/2005/8/layout/hierarchy4"/>
+    <dgm:cxn modelId="{E1DF9E38-0B7E-443A-B907-AFDD0720C15B}" srcId="{315983D5-67D9-4C06-9034-89B5E85DAD1A}" destId="{B6CD8F8F-BA52-4583-9258-19C21300A629}" srcOrd="1" destOrd="0" parTransId="{172ED792-F9F9-410B-8C6B-155566000F60}" sibTransId="{1F54B000-AAA9-4307-AB4F-8420C6B6FAE0}"/>
+    <dgm:cxn modelId="{8E6F0B57-2CC6-4F11-A099-6D3CEDB87E28}" type="presOf" srcId="{172967EE-C897-4756-A188-9F76602F5259}" destId="{BF87E022-002C-4323-A5A4-B07B82CF2C58}" srcOrd="0" destOrd="0" presId="urn:microsoft.com/office/officeart/2005/8/layout/hierarchy4"/>
+    <dgm:cxn modelId="{ABE2D179-B747-438A-8DD9-1EC2D409CAF8}" srcId="{172967EE-C897-4756-A188-9F76602F5259}" destId="{709AEA1E-5B26-4073-97C6-D151454E7A6F}" srcOrd="0" destOrd="0" parTransId="{1B00027B-2394-47EE-82B8-4FADAF1246EF}" sibTransId="{D08C2FE6-2492-4A05-A6BF-7668BAC86743}"/>
+    <dgm:cxn modelId="{A239557B-EC3B-4088-8514-C21C2F836E95}" type="presOf" srcId="{315983D5-67D9-4C06-9034-89B5E85DAD1A}" destId="{45C53DC8-C85E-486A-BF1E-92666FB2440D}" srcOrd="0" destOrd="0" presId="urn:microsoft.com/office/officeart/2005/8/layout/hierarchy4"/>
+    <dgm:cxn modelId="{38450190-0171-49B7-A6AC-F80E885B0BFD}" srcId="{B6CD8F8F-BA52-4583-9258-19C21300A629}" destId="{514D326A-DE42-4235-9FB4-58F290A628FB}" srcOrd="1" destOrd="0" parTransId="{B260C05C-7D52-4ED2-8054-DED2445209D6}" sibTransId="{E275640F-0759-4FEB-A7A8-E9ECB0865D1A}"/>
+    <dgm:cxn modelId="{68148497-2DC4-4839-9A06-24D29EDC06B9}" srcId="{315983D5-67D9-4C06-9034-89B5E85DAD1A}" destId="{BCB2ECA5-858F-4346-AE38-280FE9BB03AD}" srcOrd="2" destOrd="0" parTransId="{82D30B57-9D36-44A8-9126-E51B9234F263}" sibTransId="{5B52B4B3-3BE7-4D68-A3F9-8DAF9FD469FF}"/>
+    <dgm:cxn modelId="{B2E54DA9-751C-41F4-B3E9-73C42049DD29}" type="presOf" srcId="{C96466FA-4D7C-41D5-8260-B045021B732D}" destId="{3A3EEF32-BC99-4250-909D-8E9E0BAEC01F}" srcOrd="0" destOrd="0" presId="urn:microsoft.com/office/officeart/2005/8/layout/hierarchy4"/>
+    <dgm:cxn modelId="{54CD7AA9-35A8-41E6-A7B1-4EBF71AEBA5B}" type="presOf" srcId="{514D326A-DE42-4235-9FB4-58F290A628FB}" destId="{D4EF0E5B-8842-46EC-ACCA-3807AADFC40D}" srcOrd="0" destOrd="0" presId="urn:microsoft.com/office/officeart/2005/8/layout/hierarchy4"/>
+    <dgm:cxn modelId="{0B5495C7-54AA-42AA-AFAC-554C43FD3FD3}" type="presOf" srcId="{709AEA1E-5B26-4073-97C6-D151454E7A6F}" destId="{70B64D6A-10D3-4D65-8616-BB35B6274C0B}" srcOrd="0" destOrd="0" presId="urn:microsoft.com/office/officeart/2005/8/layout/hierarchy4"/>
+    <dgm:cxn modelId="{F16E86CD-9E39-41D9-BDF9-FF3D55508550}" type="presOf" srcId="{B6CD8F8F-BA52-4583-9258-19C21300A629}" destId="{8A2DBF15-8713-4185-96FD-EEB209A34292}" srcOrd="0" destOrd="0" presId="urn:microsoft.com/office/officeart/2005/8/layout/hierarchy4"/>
+    <dgm:cxn modelId="{9889C9E4-EEA2-4CEE-9070-6BF7FAFA045C}" srcId="{8E643295-BA44-496D-81F1-22AD08BB7BE2}" destId="{495D8C63-AE2D-40B5-900B-46FA443CB69B}" srcOrd="1" destOrd="0" parTransId="{110E367E-A558-4B94-B94B-DE61FA380F78}" sibTransId="{712EDDD6-C5BE-4465-A145-16FE9CF00249}"/>
+    <dgm:cxn modelId="{4CA147E8-678C-4B79-BAC2-4A13BB09D72E}" type="presOf" srcId="{B65D379A-71AC-452E-BA40-ED5188D60209}" destId="{C4FB882A-8D60-4542-A14B-6AEB783C0ACF}" srcOrd="0" destOrd="0" presId="urn:microsoft.com/office/officeart/2005/8/layout/hierarchy4"/>
+    <dgm:cxn modelId="{897BE340-1364-4218-AFD4-5CBEE7B6BE81}" type="presParOf" srcId="{BF87E022-002C-4323-A5A4-B07B82CF2C58}" destId="{1D1738F1-7018-4CDE-BC4A-594F920D1EF8}" srcOrd="0" destOrd="0" presId="urn:microsoft.com/office/officeart/2005/8/layout/hierarchy4"/>
+    <dgm:cxn modelId="{EEEAA0BC-249F-489B-A2F3-17D8E61AA9AA}" type="presParOf" srcId="{1D1738F1-7018-4CDE-BC4A-594F920D1EF8}" destId="{70B64D6A-10D3-4D65-8616-BB35B6274C0B}" srcOrd="0" destOrd="0" presId="urn:microsoft.com/office/officeart/2005/8/layout/hierarchy4"/>
+    <dgm:cxn modelId="{EA40EB4B-728F-4FE3-B56E-A096BDD94A7F}" type="presParOf" srcId="{1D1738F1-7018-4CDE-BC4A-594F920D1EF8}" destId="{34875D5E-D560-40BD-88FB-7A6C563DA1DA}" srcOrd="1" destOrd="0" presId="urn:microsoft.com/office/officeart/2005/8/layout/hierarchy4"/>
+    <dgm:cxn modelId="{1968CE8F-D950-4CAC-B8DD-AB8D13A235B6}" type="presParOf" srcId="{1D1738F1-7018-4CDE-BC4A-594F920D1EF8}" destId="{4197B6A4-C94A-497D-858B-095C8C14D61E}" srcOrd="2" destOrd="0" presId="urn:microsoft.com/office/officeart/2005/8/layout/hierarchy4"/>
+    <dgm:cxn modelId="{E78A153B-14E8-4FB6-A3C0-046AEB9F58A8}" type="presParOf" srcId="{4197B6A4-C94A-497D-858B-095C8C14D61E}" destId="{E2AD26D5-DF87-428D-8024-3DA96DD2CDDE}" srcOrd="0" destOrd="0" presId="urn:microsoft.com/office/officeart/2005/8/layout/hierarchy4"/>
+    <dgm:cxn modelId="{95F3BDA7-695B-40FE-87F7-42F1D402F2A7}" type="presParOf" srcId="{E2AD26D5-DF87-428D-8024-3DA96DD2CDDE}" destId="{45C53DC8-C85E-486A-BF1E-92666FB2440D}" srcOrd="0" destOrd="0" presId="urn:microsoft.com/office/officeart/2005/8/layout/hierarchy4"/>
+    <dgm:cxn modelId="{8E6116D6-C895-4F4E-A100-D8BA079725C8}" type="presParOf" srcId="{E2AD26D5-DF87-428D-8024-3DA96DD2CDDE}" destId="{5898800A-35EA-4C9F-B35B-3234F9531789}" srcOrd="1" destOrd="0" presId="urn:microsoft.com/office/officeart/2005/8/layout/hierarchy4"/>
+    <dgm:cxn modelId="{450D3EC5-5F9C-4C66-A0DB-03C7C8DF09CF}" type="presParOf" srcId="{E2AD26D5-DF87-428D-8024-3DA96DD2CDDE}" destId="{480DDC56-400F-44FE-B8D7-B2A8D57D0A28}" srcOrd="2" destOrd="0" presId="urn:microsoft.com/office/officeart/2005/8/layout/hierarchy4"/>
+    <dgm:cxn modelId="{372FBA18-ACD1-409E-AB50-8EE37F7613F7}" type="presParOf" srcId="{480DDC56-400F-44FE-B8D7-B2A8D57D0A28}" destId="{6CEBD633-E903-496B-B1AB-16903F692999}" srcOrd="0" destOrd="0" presId="urn:microsoft.com/office/officeart/2005/8/layout/hierarchy4"/>
+    <dgm:cxn modelId="{F68D9A20-0B69-4521-9A16-5D3831889BAE}" type="presParOf" srcId="{6CEBD633-E903-496B-B1AB-16903F692999}" destId="{1AA8F2F1-4261-47EE-9C94-B7B32C7938C9}" srcOrd="0" destOrd="0" presId="urn:microsoft.com/office/officeart/2005/8/layout/hierarchy4"/>
+    <dgm:cxn modelId="{9BAD67E1-5F3F-4F6A-A8D6-212D92F7851F}" type="presParOf" srcId="{6CEBD633-E903-496B-B1AB-16903F692999}" destId="{F756E17E-B00B-4C44-AFF6-657A8BBB2ADE}" srcOrd="1" destOrd="0" presId="urn:microsoft.com/office/officeart/2005/8/layout/hierarchy4"/>
+    <dgm:cxn modelId="{8889B024-6F0E-4752-AEF2-982EA38980FB}" type="presParOf" srcId="{6CEBD633-E903-496B-B1AB-16903F692999}" destId="{294F003E-1148-4190-BA11-7124346558A2}" srcOrd="2" destOrd="0" presId="urn:microsoft.com/office/officeart/2005/8/layout/hierarchy4"/>
+    <dgm:cxn modelId="{0886945F-0CFD-4E8B-B811-87605AB48040}" type="presParOf" srcId="{294F003E-1148-4190-BA11-7124346558A2}" destId="{22F3D8C1-2C47-45DA-90BD-C320E1F6374D}" srcOrd="0" destOrd="0" presId="urn:microsoft.com/office/officeart/2005/8/layout/hierarchy4"/>
+    <dgm:cxn modelId="{9EBAFFE8-A617-4ECF-8790-6AFBA28E17B4}" type="presParOf" srcId="{22F3D8C1-2C47-45DA-90BD-C320E1F6374D}" destId="{3A3EEF32-BC99-4250-909D-8E9E0BAEC01F}" srcOrd="0" destOrd="0" presId="urn:microsoft.com/office/officeart/2005/8/layout/hierarchy4"/>
+    <dgm:cxn modelId="{AE6A8516-AD7E-43FC-A275-8B8BC10FBB30}" type="presParOf" srcId="{22F3D8C1-2C47-45DA-90BD-C320E1F6374D}" destId="{1444A6D1-462D-4EBB-9A44-3462661CF099}" srcOrd="1" destOrd="0" presId="urn:microsoft.com/office/officeart/2005/8/layout/hierarchy4"/>
+    <dgm:cxn modelId="{817E867D-DDE3-444D-AF12-8DD656C026D0}" type="presParOf" srcId="{294F003E-1148-4190-BA11-7124346558A2}" destId="{ADD5A52F-88F1-46D2-ABEB-7903D44014DD}" srcOrd="1" destOrd="0" presId="urn:microsoft.com/office/officeart/2005/8/layout/hierarchy4"/>
+    <dgm:cxn modelId="{5825C7F4-F396-45FD-89CD-368F132E0A06}" type="presParOf" srcId="{294F003E-1148-4190-BA11-7124346558A2}" destId="{63F6F864-3E57-492D-9028-DA2F6079639A}" srcOrd="2" destOrd="0" presId="urn:microsoft.com/office/officeart/2005/8/layout/hierarchy4"/>
+    <dgm:cxn modelId="{81789F80-F82B-4DE7-BE2A-312C801E1D2C}" type="presParOf" srcId="{63F6F864-3E57-492D-9028-DA2F6079639A}" destId="{89E119A1-CD64-41FB-B949-72C12ACD00DB}" srcOrd="0" destOrd="0" presId="urn:microsoft.com/office/officeart/2005/8/layout/hierarchy4"/>
+    <dgm:cxn modelId="{F108F0EC-4E66-4CD4-BBD7-4E4A2F082B23}" type="presParOf" srcId="{63F6F864-3E57-492D-9028-DA2F6079639A}" destId="{4205D810-9D6A-4C94-A949-0DB22C77649B}" srcOrd="1" destOrd="0" presId="urn:microsoft.com/office/officeart/2005/8/layout/hierarchy4"/>
+    <dgm:cxn modelId="{264095BD-DC27-44D1-B3A9-F761FDFCFF17}" type="presParOf" srcId="{480DDC56-400F-44FE-B8D7-B2A8D57D0A28}" destId="{C84E41B9-ED62-46E6-972D-963B3EFD52F7}" srcOrd="1" destOrd="0" presId="urn:microsoft.com/office/officeart/2005/8/layout/hierarchy4"/>
+    <dgm:cxn modelId="{6DB72493-253D-4EF2-A503-A1D788C0C683}" type="presParOf" srcId="{480DDC56-400F-44FE-B8D7-B2A8D57D0A28}" destId="{9BEB7217-61B8-4355-ABCD-734D6BB9F243}" srcOrd="2" destOrd="0" presId="urn:microsoft.com/office/officeart/2005/8/layout/hierarchy4"/>
+    <dgm:cxn modelId="{AC36012E-1688-40C1-BD6C-524B2CC4BA81}" type="presParOf" srcId="{9BEB7217-61B8-4355-ABCD-734D6BB9F243}" destId="{8A2DBF15-8713-4185-96FD-EEB209A34292}" srcOrd="0" destOrd="0" presId="urn:microsoft.com/office/officeart/2005/8/layout/hierarchy4"/>
+    <dgm:cxn modelId="{743F1B77-60AB-4695-820C-86F8FA77A0B2}" type="presParOf" srcId="{9BEB7217-61B8-4355-ABCD-734D6BB9F243}" destId="{C3A8E6FE-BAF2-4360-978B-43F3EBAAEEDF}" srcOrd="1" destOrd="0" presId="urn:microsoft.com/office/officeart/2005/8/layout/hierarchy4"/>
+    <dgm:cxn modelId="{B66B3DF7-50F2-485B-8958-861A9A4E7B0B}" type="presParOf" srcId="{9BEB7217-61B8-4355-ABCD-734D6BB9F243}" destId="{084F2C56-E2EF-4819-86FE-6980932C3DC3}" srcOrd="2" destOrd="0" presId="urn:microsoft.com/office/officeart/2005/8/layout/hierarchy4"/>
+    <dgm:cxn modelId="{F5E6A4DE-A37E-46F3-9F02-3FC9BF1D9921}" type="presParOf" srcId="{084F2C56-E2EF-4819-86FE-6980932C3DC3}" destId="{BB0503B4-C013-4519-BE97-20A6A27AAAD7}" srcOrd="0" destOrd="0" presId="urn:microsoft.com/office/officeart/2005/8/layout/hierarchy4"/>
+    <dgm:cxn modelId="{F94DA526-8DB0-4190-87D9-5896F3FC199C}" type="presParOf" srcId="{BB0503B4-C013-4519-BE97-20A6A27AAAD7}" destId="{C4FB882A-8D60-4542-A14B-6AEB783C0ACF}" srcOrd="0" destOrd="0" presId="urn:microsoft.com/office/officeart/2005/8/layout/hierarchy4"/>
+    <dgm:cxn modelId="{84329D4D-0A2E-4E66-8FED-AA433CC6DA45}" type="presParOf" srcId="{BB0503B4-C013-4519-BE97-20A6A27AAAD7}" destId="{AB630E9C-A0E8-4E25-8377-3A82E72FB0E0}" srcOrd="1" destOrd="0" presId="urn:microsoft.com/office/officeart/2005/8/layout/hierarchy4"/>
+    <dgm:cxn modelId="{954F8CC2-409A-4754-9C91-AE408DE47944}" type="presParOf" srcId="{084F2C56-E2EF-4819-86FE-6980932C3DC3}" destId="{4D50367B-B7EF-4BD3-815A-1BA0FC551249}" srcOrd="1" destOrd="0" presId="urn:microsoft.com/office/officeart/2005/8/layout/hierarchy4"/>
+    <dgm:cxn modelId="{AD7A0CD7-9BC2-4C53-9B47-63E9AAE1CA7C}" type="presParOf" srcId="{084F2C56-E2EF-4819-86FE-6980932C3DC3}" destId="{4F06323D-C170-4FF0-950D-C2717E98F3B9}" srcOrd="2" destOrd="0" presId="urn:microsoft.com/office/officeart/2005/8/layout/hierarchy4"/>
+    <dgm:cxn modelId="{F5903079-CADA-46DD-BA90-FF0144DE112B}" type="presParOf" srcId="{4F06323D-C170-4FF0-950D-C2717E98F3B9}" destId="{D4EF0E5B-8842-46EC-ACCA-3807AADFC40D}" srcOrd="0" destOrd="0" presId="urn:microsoft.com/office/officeart/2005/8/layout/hierarchy4"/>
+    <dgm:cxn modelId="{1FE87366-A872-406E-AD50-B09AEA0CA50C}" type="presParOf" srcId="{4F06323D-C170-4FF0-950D-C2717E98F3B9}" destId="{7497F510-F533-443F-B078-94B88FCC5A08}" srcOrd="1" destOrd="0" presId="urn:microsoft.com/office/officeart/2005/8/layout/hierarchy4"/>
+    <dgm:cxn modelId="{CC1376CB-D816-46D8-A79F-083864E012D1}" type="presParOf" srcId="{480DDC56-400F-44FE-B8D7-B2A8D57D0A28}" destId="{64C4951B-4F3A-4ED2-A091-FFC88712A04D}" srcOrd="3" destOrd="0" presId="urn:microsoft.com/office/officeart/2005/8/layout/hierarchy4"/>
+    <dgm:cxn modelId="{087E1C3C-E8E3-434D-B5B5-B9E0F606E53F}" type="presParOf" srcId="{480DDC56-400F-44FE-B8D7-B2A8D57D0A28}" destId="{FCF59A02-FDAA-4331-B967-A431269301EC}" srcOrd="4" destOrd="0" presId="urn:microsoft.com/office/officeart/2005/8/layout/hierarchy4"/>
+    <dgm:cxn modelId="{44BDEF3A-BDE8-4081-86D2-8958F5A76CFC}" type="presParOf" srcId="{FCF59A02-FDAA-4331-B967-A431269301EC}" destId="{519CF8ED-2222-4DF9-A0AA-3AC06A7AD00F}" srcOrd="0" destOrd="0" presId="urn:microsoft.com/office/officeart/2005/8/layout/hierarchy4"/>
+    <dgm:cxn modelId="{CB816170-17F3-49AA-9FD9-2F7E3777C79F}" type="presParOf" srcId="{FCF59A02-FDAA-4331-B967-A431269301EC}" destId="{FB3B89C4-B5FC-456B-91C9-66C18E5CB9DB}" srcOrd="1" destOrd="0" presId="urn:microsoft.com/office/officeart/2005/8/layout/hierarchy4"/>
   </dgm:cxnLst>
   <dgm:bg/>
   <dgm:whole/>
@@ -4101,6 +5387,738 @@
 </dsp:drawing>
 </file>
 
+<file path=ppt/diagrams/drawing2.xml><?xml version="1.0" encoding="utf-8"?>
+<dsp:drawing xmlns:dgm="http://schemas.openxmlformats.org/drawingml/2006/diagram" xmlns:dsp="http://schemas.microsoft.com/office/drawing/2008/diagram" xmlns:a="http://schemas.openxmlformats.org/drawingml/2006/main">
+  <dsp:spTree>
+    <dsp:nvGrpSpPr>
+      <dsp:cNvPr id="0" name=""/>
+      <dsp:cNvGrpSpPr/>
+    </dsp:nvGrpSpPr>
+    <dsp:grpSpPr/>
+    <dsp:sp modelId="{70B64D6A-10D3-4D65-8616-BB35B6274C0B}">
+      <dsp:nvSpPr>
+        <dsp:cNvPr id="0" name=""/>
+        <dsp:cNvSpPr/>
+      </dsp:nvSpPr>
+      <dsp:spPr>
+        <a:xfrm>
+          <a:off x="418" y="1503"/>
+          <a:ext cx="10514763" cy="986912"/>
+        </a:xfrm>
+        <a:prstGeom prst="roundRect">
+          <a:avLst>
+            <a:gd name="adj" fmla="val 10000"/>
+          </a:avLst>
+        </a:prstGeom>
+        <a:solidFill>
+          <a:schemeClr val="accent1">
+            <a:hueOff val="0"/>
+            <a:satOff val="0"/>
+            <a:lumOff val="0"/>
+            <a:alphaOff val="0"/>
+          </a:schemeClr>
+        </a:solidFill>
+        <a:ln w="12700" cap="flat" cmpd="sng" algn="ctr">
+          <a:solidFill>
+            <a:schemeClr val="lt1">
+              <a:hueOff val="0"/>
+              <a:satOff val="0"/>
+              <a:lumOff val="0"/>
+              <a:alphaOff val="0"/>
+            </a:schemeClr>
+          </a:solidFill>
+          <a:prstDash val="solid"/>
+          <a:miter lim="800000"/>
+        </a:ln>
+        <a:effectLst/>
+      </dsp:spPr>
+      <dsp:style>
+        <a:lnRef idx="2">
+          <a:scrgbClr r="0" g="0" b="0"/>
+        </a:lnRef>
+        <a:fillRef idx="1">
+          <a:scrgbClr r="0" g="0" b="0"/>
+        </a:fillRef>
+        <a:effectRef idx="0">
+          <a:scrgbClr r="0" g="0" b="0"/>
+        </a:effectRef>
+        <a:fontRef idx="minor">
+          <a:schemeClr val="lt1"/>
+        </a:fontRef>
+      </dsp:style>
+      <dsp:txBody>
+        <a:bodyPr spcFirstLastPara="0" vert="horz" wrap="square" lIns="163830" tIns="163830" rIns="163830" bIns="163830" numCol="1" spcCol="1270" anchor="ctr" anchorCtr="0">
+          <a:noAutofit/>
+        </a:bodyPr>
+        <a:lstStyle/>
+        <a:p>
+          <a:pPr marL="0" lvl="0" indent="0" algn="ctr" defTabSz="1911350">
+            <a:lnSpc>
+              <a:spcPct val="90000"/>
+            </a:lnSpc>
+            <a:spcBef>
+              <a:spcPct val="0"/>
+            </a:spcBef>
+            <a:spcAft>
+              <a:spcPct val="35000"/>
+            </a:spcAft>
+            <a:buNone/>
+          </a:pPr>
+          <a:r>
+            <a:rPr lang="en-CA" sz="4300" kern="1200" dirty="0"/>
+            <a:t>Browser</a:t>
+          </a:r>
+        </a:p>
+      </dsp:txBody>
+      <dsp:txXfrm>
+        <a:off x="29324" y="30409"/>
+        <a:ext cx="10456951" cy="929100"/>
+      </dsp:txXfrm>
+    </dsp:sp>
+    <dsp:sp modelId="{45C53DC8-C85E-486A-BF1E-92666FB2440D}">
+      <dsp:nvSpPr>
+        <dsp:cNvPr id="0" name=""/>
+        <dsp:cNvSpPr/>
+      </dsp:nvSpPr>
+      <dsp:spPr>
+        <a:xfrm>
+          <a:off x="418" y="1121976"/>
+          <a:ext cx="10514763" cy="986912"/>
+        </a:xfrm>
+        <a:prstGeom prst="roundRect">
+          <a:avLst>
+            <a:gd name="adj" fmla="val 10000"/>
+          </a:avLst>
+        </a:prstGeom>
+        <a:solidFill>
+          <a:schemeClr val="accent1">
+            <a:hueOff val="0"/>
+            <a:satOff val="0"/>
+            <a:lumOff val="0"/>
+            <a:alphaOff val="0"/>
+          </a:schemeClr>
+        </a:solidFill>
+        <a:ln w="12700" cap="flat" cmpd="sng" algn="ctr">
+          <a:solidFill>
+            <a:schemeClr val="lt1">
+              <a:hueOff val="0"/>
+              <a:satOff val="0"/>
+              <a:lumOff val="0"/>
+              <a:alphaOff val="0"/>
+            </a:schemeClr>
+          </a:solidFill>
+          <a:prstDash val="solid"/>
+          <a:miter lim="800000"/>
+        </a:ln>
+        <a:effectLst/>
+      </dsp:spPr>
+      <dsp:style>
+        <a:lnRef idx="2">
+          <a:scrgbClr r="0" g="0" b="0"/>
+        </a:lnRef>
+        <a:fillRef idx="1">
+          <a:scrgbClr r="0" g="0" b="0"/>
+        </a:fillRef>
+        <a:effectRef idx="0">
+          <a:scrgbClr r="0" g="0" b="0"/>
+        </a:effectRef>
+        <a:fontRef idx="minor">
+          <a:schemeClr val="lt1"/>
+        </a:fontRef>
+      </dsp:style>
+      <dsp:txBody>
+        <a:bodyPr spcFirstLastPara="0" vert="horz" wrap="square" lIns="163830" tIns="163830" rIns="163830" bIns="163830" numCol="1" spcCol="1270" anchor="ctr" anchorCtr="0">
+          <a:noAutofit/>
+        </a:bodyPr>
+        <a:lstStyle/>
+        <a:p>
+          <a:pPr marL="0" lvl="0" indent="0" algn="ctr" defTabSz="1911350">
+            <a:lnSpc>
+              <a:spcPct val="90000"/>
+            </a:lnSpc>
+            <a:spcBef>
+              <a:spcPct val="0"/>
+            </a:spcBef>
+            <a:spcAft>
+              <a:spcPct val="35000"/>
+            </a:spcAft>
+            <a:buNone/>
+          </a:pPr>
+          <a:r>
+            <a:rPr lang="en-CA" sz="4300" kern="1200" dirty="0"/>
+            <a:t>Backends</a:t>
+          </a:r>
+        </a:p>
+      </dsp:txBody>
+      <dsp:txXfrm>
+        <a:off x="29324" y="1150882"/>
+        <a:ext cx="10456951" cy="929100"/>
+      </dsp:txXfrm>
+    </dsp:sp>
+    <dsp:sp modelId="{1AA8F2F1-4261-47EE-9C94-B7B32C7938C9}">
+      <dsp:nvSpPr>
+        <dsp:cNvPr id="0" name=""/>
+        <dsp:cNvSpPr/>
+      </dsp:nvSpPr>
+      <dsp:spPr>
+        <a:xfrm>
+          <a:off x="418" y="2242449"/>
+          <a:ext cx="4145598" cy="986912"/>
+        </a:xfrm>
+        <a:prstGeom prst="roundRect">
+          <a:avLst>
+            <a:gd name="adj" fmla="val 10000"/>
+          </a:avLst>
+        </a:prstGeom>
+        <a:solidFill>
+          <a:schemeClr val="accent1">
+            <a:hueOff val="0"/>
+            <a:satOff val="0"/>
+            <a:lumOff val="0"/>
+            <a:alphaOff val="0"/>
+          </a:schemeClr>
+        </a:solidFill>
+        <a:ln w="12700" cap="flat" cmpd="sng" algn="ctr">
+          <a:solidFill>
+            <a:schemeClr val="lt1">
+              <a:hueOff val="0"/>
+              <a:satOff val="0"/>
+              <a:lumOff val="0"/>
+              <a:alphaOff val="0"/>
+            </a:schemeClr>
+          </a:solidFill>
+          <a:prstDash val="solid"/>
+          <a:miter lim="800000"/>
+        </a:ln>
+        <a:effectLst/>
+      </dsp:spPr>
+      <dsp:style>
+        <a:lnRef idx="2">
+          <a:scrgbClr r="0" g="0" b="0"/>
+        </a:lnRef>
+        <a:fillRef idx="1">
+          <a:scrgbClr r="0" g="0" b="0"/>
+        </a:fillRef>
+        <a:effectRef idx="0">
+          <a:scrgbClr r="0" g="0" b="0"/>
+        </a:effectRef>
+        <a:fontRef idx="minor">
+          <a:schemeClr val="lt1"/>
+        </a:fontRef>
+      </dsp:style>
+      <dsp:txBody>
+        <a:bodyPr spcFirstLastPara="0" vert="horz" wrap="square" lIns="125730" tIns="125730" rIns="125730" bIns="125730" numCol="1" spcCol="1270" anchor="ctr" anchorCtr="0">
+          <a:noAutofit/>
+        </a:bodyPr>
+        <a:lstStyle/>
+        <a:p>
+          <a:pPr marL="0" lvl="0" indent="0" algn="ctr" defTabSz="1466850">
+            <a:lnSpc>
+              <a:spcPct val="90000"/>
+            </a:lnSpc>
+            <a:spcBef>
+              <a:spcPct val="0"/>
+            </a:spcBef>
+            <a:spcAft>
+              <a:spcPct val="35000"/>
+            </a:spcAft>
+            <a:buNone/>
+          </a:pPr>
+          <a:r>
+            <a:rPr lang="en-CA" sz="3300" kern="1200" dirty="0"/>
+            <a:t>Backend1</a:t>
+          </a:r>
+        </a:p>
+      </dsp:txBody>
+      <dsp:txXfrm>
+        <a:off x="29324" y="2271355"/>
+        <a:ext cx="4087786" cy="929100"/>
+      </dsp:txXfrm>
+    </dsp:sp>
+    <dsp:sp modelId="{3A3EEF32-BC99-4250-909D-8E9E0BAEC01F}">
+      <dsp:nvSpPr>
+        <dsp:cNvPr id="0" name=""/>
+        <dsp:cNvSpPr/>
+      </dsp:nvSpPr>
+      <dsp:spPr>
+        <a:xfrm>
+          <a:off x="418" y="3362922"/>
+          <a:ext cx="2051260" cy="986912"/>
+        </a:xfrm>
+        <a:prstGeom prst="roundRect">
+          <a:avLst>
+            <a:gd name="adj" fmla="val 10000"/>
+          </a:avLst>
+        </a:prstGeom>
+        <a:solidFill>
+          <a:schemeClr val="accent1">
+            <a:hueOff val="0"/>
+            <a:satOff val="0"/>
+            <a:lumOff val="0"/>
+            <a:alphaOff val="0"/>
+          </a:schemeClr>
+        </a:solidFill>
+        <a:ln w="12700" cap="flat" cmpd="sng" algn="ctr">
+          <a:solidFill>
+            <a:schemeClr val="lt1">
+              <a:hueOff val="0"/>
+              <a:satOff val="0"/>
+              <a:lumOff val="0"/>
+              <a:alphaOff val="0"/>
+            </a:schemeClr>
+          </a:solidFill>
+          <a:prstDash val="solid"/>
+          <a:miter lim="800000"/>
+        </a:ln>
+        <a:effectLst/>
+      </dsp:spPr>
+      <dsp:style>
+        <a:lnRef idx="2">
+          <a:scrgbClr r="0" g="0" b="0"/>
+        </a:lnRef>
+        <a:fillRef idx="1">
+          <a:scrgbClr r="0" g="0" b="0"/>
+        </a:fillRef>
+        <a:effectRef idx="0">
+          <a:scrgbClr r="0" g="0" b="0"/>
+        </a:effectRef>
+        <a:fontRef idx="minor">
+          <a:schemeClr val="lt1"/>
+        </a:fontRef>
+      </dsp:style>
+      <dsp:txBody>
+        <a:bodyPr spcFirstLastPara="0" vert="horz" wrap="square" lIns="114300" tIns="114300" rIns="114300" bIns="114300" numCol="1" spcCol="1270" anchor="ctr" anchorCtr="0">
+          <a:noAutofit/>
+        </a:bodyPr>
+        <a:lstStyle/>
+        <a:p>
+          <a:pPr marL="0" lvl="0" indent="0" algn="ctr" defTabSz="1333500">
+            <a:lnSpc>
+              <a:spcPct val="90000"/>
+            </a:lnSpc>
+            <a:spcBef>
+              <a:spcPct val="0"/>
+            </a:spcBef>
+            <a:spcAft>
+              <a:spcPct val="35000"/>
+            </a:spcAft>
+            <a:buNone/>
+          </a:pPr>
+          <a:r>
+            <a:rPr lang="en-CA" sz="3000" kern="1200" dirty="0"/>
+            <a:t>User</a:t>
+          </a:r>
+        </a:p>
+      </dsp:txBody>
+      <dsp:txXfrm>
+        <a:off x="29324" y="3391828"/>
+        <a:ext cx="1993448" cy="929100"/>
+      </dsp:txXfrm>
+    </dsp:sp>
+    <dsp:sp modelId="{89E119A1-CD64-41FB-B949-72C12ACD00DB}">
+      <dsp:nvSpPr>
+        <dsp:cNvPr id="0" name=""/>
+        <dsp:cNvSpPr/>
+      </dsp:nvSpPr>
+      <dsp:spPr>
+        <a:xfrm>
+          <a:off x="2094755" y="3362922"/>
+          <a:ext cx="2051260" cy="986912"/>
+        </a:xfrm>
+        <a:prstGeom prst="roundRect">
+          <a:avLst>
+            <a:gd name="adj" fmla="val 10000"/>
+          </a:avLst>
+        </a:prstGeom>
+        <a:solidFill>
+          <a:schemeClr val="accent1">
+            <a:hueOff val="0"/>
+            <a:satOff val="0"/>
+            <a:lumOff val="0"/>
+            <a:alphaOff val="0"/>
+          </a:schemeClr>
+        </a:solidFill>
+        <a:ln w="12700" cap="flat" cmpd="sng" algn="ctr">
+          <a:solidFill>
+            <a:schemeClr val="lt1">
+              <a:hueOff val="0"/>
+              <a:satOff val="0"/>
+              <a:lumOff val="0"/>
+              <a:alphaOff val="0"/>
+            </a:schemeClr>
+          </a:solidFill>
+          <a:prstDash val="solid"/>
+          <a:miter lim="800000"/>
+        </a:ln>
+        <a:effectLst/>
+      </dsp:spPr>
+      <dsp:style>
+        <a:lnRef idx="2">
+          <a:scrgbClr r="0" g="0" b="0"/>
+        </a:lnRef>
+        <a:fillRef idx="1">
+          <a:scrgbClr r="0" g="0" b="0"/>
+        </a:fillRef>
+        <a:effectRef idx="0">
+          <a:scrgbClr r="0" g="0" b="0"/>
+        </a:effectRef>
+        <a:fontRef idx="minor">
+          <a:schemeClr val="lt1"/>
+        </a:fontRef>
+      </dsp:style>
+      <dsp:txBody>
+        <a:bodyPr spcFirstLastPara="0" vert="horz" wrap="square" lIns="114300" tIns="114300" rIns="114300" bIns="114300" numCol="1" spcCol="1270" anchor="ctr" anchorCtr="0">
+          <a:noAutofit/>
+        </a:bodyPr>
+        <a:lstStyle/>
+        <a:p>
+          <a:pPr marL="0" lvl="0" indent="0" algn="ctr" defTabSz="1333500">
+            <a:lnSpc>
+              <a:spcPct val="90000"/>
+            </a:lnSpc>
+            <a:spcBef>
+              <a:spcPct val="0"/>
+            </a:spcBef>
+            <a:spcAft>
+              <a:spcPct val="35000"/>
+            </a:spcAft>
+            <a:buNone/>
+          </a:pPr>
+          <a:r>
+            <a:rPr lang="en-CA" sz="3000" kern="1200" dirty="0"/>
+            <a:t>Auth Token</a:t>
+          </a:r>
+        </a:p>
+      </dsp:txBody>
+      <dsp:txXfrm>
+        <a:off x="2123661" y="3391828"/>
+        <a:ext cx="1993448" cy="929100"/>
+      </dsp:txXfrm>
+    </dsp:sp>
+    <dsp:sp modelId="{8A2DBF15-8713-4185-96FD-EEB209A34292}">
+      <dsp:nvSpPr>
+        <dsp:cNvPr id="0" name=""/>
+        <dsp:cNvSpPr/>
+      </dsp:nvSpPr>
+      <dsp:spPr>
+        <a:xfrm>
+          <a:off x="4232169" y="2242449"/>
+          <a:ext cx="4145598" cy="986912"/>
+        </a:xfrm>
+        <a:prstGeom prst="roundRect">
+          <a:avLst>
+            <a:gd name="adj" fmla="val 10000"/>
+          </a:avLst>
+        </a:prstGeom>
+        <a:solidFill>
+          <a:schemeClr val="accent1">
+            <a:hueOff val="0"/>
+            <a:satOff val="0"/>
+            <a:lumOff val="0"/>
+            <a:alphaOff val="0"/>
+          </a:schemeClr>
+        </a:solidFill>
+        <a:ln w="12700" cap="flat" cmpd="sng" algn="ctr">
+          <a:solidFill>
+            <a:schemeClr val="lt1">
+              <a:hueOff val="0"/>
+              <a:satOff val="0"/>
+              <a:lumOff val="0"/>
+              <a:alphaOff val="0"/>
+            </a:schemeClr>
+          </a:solidFill>
+          <a:prstDash val="solid"/>
+          <a:miter lim="800000"/>
+        </a:ln>
+        <a:effectLst/>
+      </dsp:spPr>
+      <dsp:style>
+        <a:lnRef idx="2">
+          <a:scrgbClr r="0" g="0" b="0"/>
+        </a:lnRef>
+        <a:fillRef idx="1">
+          <a:scrgbClr r="0" g="0" b="0"/>
+        </a:fillRef>
+        <a:effectRef idx="0">
+          <a:scrgbClr r="0" g="0" b="0"/>
+        </a:effectRef>
+        <a:fontRef idx="minor">
+          <a:schemeClr val="lt1"/>
+        </a:fontRef>
+      </dsp:style>
+      <dsp:txBody>
+        <a:bodyPr spcFirstLastPara="0" vert="horz" wrap="square" lIns="125730" tIns="125730" rIns="125730" bIns="125730" numCol="1" spcCol="1270" anchor="ctr" anchorCtr="0">
+          <a:noAutofit/>
+        </a:bodyPr>
+        <a:lstStyle/>
+        <a:p>
+          <a:pPr marL="0" lvl="0" indent="0" algn="ctr" defTabSz="1466850">
+            <a:lnSpc>
+              <a:spcPct val="90000"/>
+            </a:lnSpc>
+            <a:spcBef>
+              <a:spcPct val="0"/>
+            </a:spcBef>
+            <a:spcAft>
+              <a:spcPct val="35000"/>
+            </a:spcAft>
+            <a:buNone/>
+          </a:pPr>
+          <a:r>
+            <a:rPr lang="en-CA" sz="3300" kern="1200" dirty="0"/>
+            <a:t>Backend2</a:t>
+          </a:r>
+        </a:p>
+      </dsp:txBody>
+      <dsp:txXfrm>
+        <a:off x="4261075" y="2271355"/>
+        <a:ext cx="4087786" cy="929100"/>
+      </dsp:txXfrm>
+    </dsp:sp>
+    <dsp:sp modelId="{C4FB882A-8D60-4542-A14B-6AEB783C0ACF}">
+      <dsp:nvSpPr>
+        <dsp:cNvPr id="0" name=""/>
+        <dsp:cNvSpPr/>
+      </dsp:nvSpPr>
+      <dsp:spPr>
+        <a:xfrm>
+          <a:off x="4232169" y="3362922"/>
+          <a:ext cx="2051260" cy="986912"/>
+        </a:xfrm>
+        <a:prstGeom prst="roundRect">
+          <a:avLst>
+            <a:gd name="adj" fmla="val 10000"/>
+          </a:avLst>
+        </a:prstGeom>
+        <a:solidFill>
+          <a:schemeClr val="accent1">
+            <a:hueOff val="0"/>
+            <a:satOff val="0"/>
+            <a:lumOff val="0"/>
+            <a:alphaOff val="0"/>
+          </a:schemeClr>
+        </a:solidFill>
+        <a:ln w="12700" cap="flat" cmpd="sng" algn="ctr">
+          <a:solidFill>
+            <a:schemeClr val="lt1">
+              <a:hueOff val="0"/>
+              <a:satOff val="0"/>
+              <a:lumOff val="0"/>
+              <a:alphaOff val="0"/>
+            </a:schemeClr>
+          </a:solidFill>
+          <a:prstDash val="solid"/>
+          <a:miter lim="800000"/>
+        </a:ln>
+        <a:effectLst/>
+      </dsp:spPr>
+      <dsp:style>
+        <a:lnRef idx="2">
+          <a:scrgbClr r="0" g="0" b="0"/>
+        </a:lnRef>
+        <a:fillRef idx="1">
+          <a:scrgbClr r="0" g="0" b="0"/>
+        </a:fillRef>
+        <a:effectRef idx="0">
+          <a:scrgbClr r="0" g="0" b="0"/>
+        </a:effectRef>
+        <a:fontRef idx="minor">
+          <a:schemeClr val="lt1"/>
+        </a:fontRef>
+      </dsp:style>
+      <dsp:txBody>
+        <a:bodyPr spcFirstLastPara="0" vert="horz" wrap="square" lIns="114300" tIns="114300" rIns="114300" bIns="114300" numCol="1" spcCol="1270" anchor="ctr" anchorCtr="0">
+          <a:noAutofit/>
+        </a:bodyPr>
+        <a:lstStyle/>
+        <a:p>
+          <a:pPr marL="0" lvl="0" indent="0" algn="ctr" defTabSz="1333500">
+            <a:lnSpc>
+              <a:spcPct val="90000"/>
+            </a:lnSpc>
+            <a:spcBef>
+              <a:spcPct val="0"/>
+            </a:spcBef>
+            <a:spcAft>
+              <a:spcPct val="35000"/>
+            </a:spcAft>
+            <a:buNone/>
+          </a:pPr>
+          <a:r>
+            <a:rPr lang="en-CA" sz="3000" kern="1200" dirty="0"/>
+            <a:t>User</a:t>
+          </a:r>
+        </a:p>
+      </dsp:txBody>
+      <dsp:txXfrm>
+        <a:off x="4261075" y="3391828"/>
+        <a:ext cx="1993448" cy="929100"/>
+      </dsp:txXfrm>
+    </dsp:sp>
+    <dsp:sp modelId="{D4EF0E5B-8842-46EC-ACCA-3807AADFC40D}">
+      <dsp:nvSpPr>
+        <dsp:cNvPr id="0" name=""/>
+        <dsp:cNvSpPr/>
+      </dsp:nvSpPr>
+      <dsp:spPr>
+        <a:xfrm>
+          <a:off x="6326506" y="3362922"/>
+          <a:ext cx="2051260" cy="986912"/>
+        </a:xfrm>
+        <a:prstGeom prst="roundRect">
+          <a:avLst>
+            <a:gd name="adj" fmla="val 10000"/>
+          </a:avLst>
+        </a:prstGeom>
+        <a:solidFill>
+          <a:schemeClr val="accent1">
+            <a:hueOff val="0"/>
+            <a:satOff val="0"/>
+            <a:lumOff val="0"/>
+            <a:alphaOff val="0"/>
+          </a:schemeClr>
+        </a:solidFill>
+        <a:ln w="12700" cap="flat" cmpd="sng" algn="ctr">
+          <a:solidFill>
+            <a:schemeClr val="lt1">
+              <a:hueOff val="0"/>
+              <a:satOff val="0"/>
+              <a:lumOff val="0"/>
+              <a:alphaOff val="0"/>
+            </a:schemeClr>
+          </a:solidFill>
+          <a:prstDash val="solid"/>
+          <a:miter lim="800000"/>
+        </a:ln>
+        <a:effectLst/>
+      </dsp:spPr>
+      <dsp:style>
+        <a:lnRef idx="2">
+          <a:scrgbClr r="0" g="0" b="0"/>
+        </a:lnRef>
+        <a:fillRef idx="1">
+          <a:scrgbClr r="0" g="0" b="0"/>
+        </a:fillRef>
+        <a:effectRef idx="0">
+          <a:scrgbClr r="0" g="0" b="0"/>
+        </a:effectRef>
+        <a:fontRef idx="minor">
+          <a:schemeClr val="lt1"/>
+        </a:fontRef>
+      </dsp:style>
+      <dsp:txBody>
+        <a:bodyPr spcFirstLastPara="0" vert="horz" wrap="square" lIns="114300" tIns="114300" rIns="114300" bIns="114300" numCol="1" spcCol="1270" anchor="ctr" anchorCtr="0">
+          <a:noAutofit/>
+        </a:bodyPr>
+        <a:lstStyle/>
+        <a:p>
+          <a:pPr marL="0" lvl="0" indent="0" algn="ctr" defTabSz="1333500">
+            <a:lnSpc>
+              <a:spcPct val="90000"/>
+            </a:lnSpc>
+            <a:spcBef>
+              <a:spcPct val="0"/>
+            </a:spcBef>
+            <a:spcAft>
+              <a:spcPct val="35000"/>
+            </a:spcAft>
+            <a:buNone/>
+          </a:pPr>
+          <a:r>
+            <a:rPr lang="en-CA" sz="3000" kern="1200" dirty="0"/>
+            <a:t>Auth Token</a:t>
+          </a:r>
+        </a:p>
+      </dsp:txBody>
+      <dsp:txXfrm>
+        <a:off x="6355412" y="3391828"/>
+        <a:ext cx="1993448" cy="929100"/>
+      </dsp:txXfrm>
+    </dsp:sp>
+    <dsp:sp modelId="{519CF8ED-2222-4DF9-A0AA-3AC06A7AD00F}">
+      <dsp:nvSpPr>
+        <dsp:cNvPr id="0" name=""/>
+        <dsp:cNvSpPr/>
+      </dsp:nvSpPr>
+      <dsp:spPr>
+        <a:xfrm>
+          <a:off x="8463920" y="2242449"/>
+          <a:ext cx="2051260" cy="986912"/>
+        </a:xfrm>
+        <a:prstGeom prst="roundRect">
+          <a:avLst>
+            <a:gd name="adj" fmla="val 10000"/>
+          </a:avLst>
+        </a:prstGeom>
+        <a:solidFill>
+          <a:schemeClr val="accent1">
+            <a:hueOff val="0"/>
+            <a:satOff val="0"/>
+            <a:lumOff val="0"/>
+            <a:alphaOff val="0"/>
+          </a:schemeClr>
+        </a:solidFill>
+        <a:ln w="12700" cap="flat" cmpd="sng" algn="ctr">
+          <a:solidFill>
+            <a:schemeClr val="lt1">
+              <a:hueOff val="0"/>
+              <a:satOff val="0"/>
+              <a:lumOff val="0"/>
+              <a:alphaOff val="0"/>
+            </a:schemeClr>
+          </a:solidFill>
+          <a:prstDash val="solid"/>
+          <a:miter lim="800000"/>
+        </a:ln>
+        <a:effectLst/>
+      </dsp:spPr>
+      <dsp:style>
+        <a:lnRef idx="2">
+          <a:scrgbClr r="0" g="0" b="0"/>
+        </a:lnRef>
+        <a:fillRef idx="1">
+          <a:scrgbClr r="0" g="0" b="0"/>
+        </a:fillRef>
+        <a:effectRef idx="0">
+          <a:scrgbClr r="0" g="0" b="0"/>
+        </a:effectRef>
+        <a:fontRef idx="minor">
+          <a:schemeClr val="lt1"/>
+        </a:fontRef>
+      </dsp:style>
+      <dsp:txBody>
+        <a:bodyPr spcFirstLastPara="0" vert="horz" wrap="square" lIns="125730" tIns="125730" rIns="125730" bIns="125730" numCol="1" spcCol="1270" anchor="ctr" anchorCtr="0">
+          <a:noAutofit/>
+        </a:bodyPr>
+        <a:lstStyle/>
+        <a:p>
+          <a:pPr marL="0" lvl="0" indent="0" algn="ctr" defTabSz="1466850">
+            <a:lnSpc>
+              <a:spcPct val="90000"/>
+            </a:lnSpc>
+            <a:spcBef>
+              <a:spcPct val="0"/>
+            </a:spcBef>
+            <a:spcAft>
+              <a:spcPct val="35000"/>
+            </a:spcAft>
+            <a:buNone/>
+          </a:pPr>
+          <a:r>
+            <a:rPr lang="en-CA" sz="3300" kern="1200" dirty="0"/>
+            <a:t>Backend3</a:t>
+          </a:r>
+        </a:p>
+      </dsp:txBody>
+      <dsp:txXfrm>
+        <a:off x="8492826" y="2271355"/>
+        <a:ext cx="1993448" cy="929100"/>
+      </dsp:txXfrm>
+    </dsp:sp>
+  </dsp:spTree>
+</dsp:drawing>
+</file>
+
 <file path=ppt/diagrams/layout1.xml><?xml version="1.0" encoding="utf-8"?>
 <dgm:layoutDef xmlns:dgm="http://schemas.openxmlformats.org/drawingml/2006/diagram" xmlns:a="http://schemas.openxmlformats.org/drawingml/2006/main" uniqueId="urn:microsoft.com/office/officeart/2005/8/layout/architecture">
   <dgm:title val="Architecture Layout"/>
@@ -4624,7 +6642,1563 @@
 </dgm:layoutDef>
 </file>
 
+<file path=ppt/diagrams/layout2.xml><?xml version="1.0" encoding="utf-8"?>
+<dgm:layoutDef xmlns:dgm="http://schemas.openxmlformats.org/drawingml/2006/diagram" xmlns:a="http://schemas.openxmlformats.org/drawingml/2006/main" uniqueId="urn:microsoft.com/office/officeart/2005/8/layout/hierarchy4">
+  <dgm:title val=""/>
+  <dgm:desc val=""/>
+  <dgm:catLst>
+    <dgm:cat type="hierarchy" pri="4000"/>
+    <dgm:cat type="list" pri="24000"/>
+    <dgm:cat type="relationship" pri="10000"/>
+  </dgm:catLst>
+  <dgm:sampData>
+    <dgm:dataModel>
+      <dgm:ptLst>
+        <dgm:pt modelId="0" type="doc"/>
+        <dgm:pt modelId="1">
+          <dgm:prSet phldr="1"/>
+        </dgm:pt>
+        <dgm:pt modelId="2">
+          <dgm:prSet phldr="1"/>
+        </dgm:pt>
+        <dgm:pt modelId="21">
+          <dgm:prSet phldr="1"/>
+        </dgm:pt>
+        <dgm:pt modelId="22">
+          <dgm:prSet phldr="1"/>
+        </dgm:pt>
+        <dgm:pt modelId="3">
+          <dgm:prSet phldr="1"/>
+        </dgm:pt>
+        <dgm:pt modelId="31">
+          <dgm:prSet phldr="1"/>
+        </dgm:pt>
+      </dgm:ptLst>
+      <dgm:cxnLst>
+        <dgm:cxn modelId="4" srcId="0" destId="1" srcOrd="0" destOrd="0"/>
+        <dgm:cxn modelId="5" srcId="1" destId="2" srcOrd="0" destOrd="0"/>
+        <dgm:cxn modelId="6" srcId="1" destId="3" srcOrd="1" destOrd="0"/>
+        <dgm:cxn modelId="23" srcId="2" destId="21" srcOrd="0" destOrd="0"/>
+        <dgm:cxn modelId="24" srcId="2" destId="22" srcOrd="1" destOrd="0"/>
+        <dgm:cxn modelId="33" srcId="3" destId="31" srcOrd="0" destOrd="0"/>
+      </dgm:cxnLst>
+      <dgm:bg/>
+      <dgm:whole/>
+    </dgm:dataModel>
+  </dgm:sampData>
+  <dgm:styleData>
+    <dgm:dataModel>
+      <dgm:ptLst>
+        <dgm:pt modelId="0" type="doc"/>
+        <dgm:pt modelId="1"/>
+        <dgm:pt modelId="11"/>
+        <dgm:pt modelId="12"/>
+      </dgm:ptLst>
+      <dgm:cxnLst>
+        <dgm:cxn modelId="2" srcId="0" destId="1" srcOrd="0" destOrd="0"/>
+        <dgm:cxn modelId="13" srcId="1" destId="11" srcOrd="0" destOrd="0"/>
+        <dgm:cxn modelId="14" srcId="1" destId="12" srcOrd="1" destOrd="0"/>
+      </dgm:cxnLst>
+      <dgm:bg/>
+      <dgm:whole/>
+    </dgm:dataModel>
+  </dgm:styleData>
+  <dgm:clrData>
+    <dgm:dataModel>
+      <dgm:ptLst>
+        <dgm:pt modelId="0" type="doc"/>
+        <dgm:pt modelId="1"/>
+        <dgm:pt modelId="2"/>
+        <dgm:pt modelId="21"/>
+        <dgm:pt modelId="211"/>
+        <dgm:pt modelId="3"/>
+        <dgm:pt modelId="31"/>
+        <dgm:pt modelId="311"/>
+      </dgm:ptLst>
+      <dgm:cxnLst>
+        <dgm:cxn modelId="4" srcId="0" destId="1" srcOrd="0" destOrd="0"/>
+        <dgm:cxn modelId="5" srcId="1" destId="2" srcOrd="0" destOrd="0"/>
+        <dgm:cxn modelId="6" srcId="1" destId="3" srcOrd="1" destOrd="0"/>
+        <dgm:cxn modelId="23" srcId="2" destId="21" srcOrd="0" destOrd="0"/>
+        <dgm:cxn modelId="24" srcId="21" destId="211" srcOrd="0" destOrd="0"/>
+        <dgm:cxn modelId="33" srcId="3" destId="31" srcOrd="0" destOrd="0"/>
+        <dgm:cxn modelId="34" srcId="31" destId="311" srcOrd="0" destOrd="0"/>
+      </dgm:cxnLst>
+      <dgm:bg/>
+      <dgm:whole/>
+    </dgm:dataModel>
+  </dgm:clrData>
+  <dgm:layoutNode name="Name0">
+    <dgm:varLst>
+      <dgm:chPref val="1"/>
+      <dgm:dir/>
+      <dgm:animOne val="branch"/>
+      <dgm:animLvl val="lvl"/>
+      <dgm:resizeHandles/>
+    </dgm:varLst>
+    <dgm:choose name="Name1">
+      <dgm:if name="Name2" func="var" arg="dir" op="equ" val="norm">
+        <dgm:alg type="lin">
+          <dgm:param type="linDir" val="fromL"/>
+          <dgm:param type="nodeVertAlign" val="t"/>
+        </dgm:alg>
+      </dgm:if>
+      <dgm:else name="Name3">
+        <dgm:alg type="lin">
+          <dgm:param type="linDir" val="fromR"/>
+          <dgm:param type="nodeVertAlign" val="t"/>
+        </dgm:alg>
+      </dgm:else>
+    </dgm:choose>
+    <dgm:shape xmlns:r="http://schemas.openxmlformats.org/officeDocument/2006/relationships" r:blip="">
+      <dgm:adjLst/>
+    </dgm:shape>
+    <dgm:presOf/>
+    <dgm:constrLst>
+      <dgm:constr type="w" for="ch" forName="vertOne" refType="w"/>
+      <dgm:constr type="w" for="des" forName="horzOne" refType="w"/>
+      <dgm:constr type="w" for="des" forName="txOne" refType="w"/>
+      <dgm:constr type="w" for="des" forName="vertTwo" refType="w"/>
+      <dgm:constr type="w" for="des" forName="horzTwo" refType="w"/>
+      <dgm:constr type="w" for="des" forName="txTwo" refType="w"/>
+      <dgm:constr type="w" for="des" forName="vertThree" refType="w"/>
+      <dgm:constr type="w" for="des" forName="horzThree" refType="w"/>
+      <dgm:constr type="w" for="des" forName="txThree" refType="w"/>
+      <dgm:constr type="w" for="des" forName="vertFour" refType="w"/>
+      <dgm:constr type="w" for="des" forName="horzFour" refType="w"/>
+      <dgm:constr type="w" for="des" forName="txFour" refType="w"/>
+      <dgm:constr type="h" for="des" ptType="node" op="equ"/>
+      <dgm:constr type="h" for="des" forName="txOne" refType="h"/>
+      <dgm:constr type="userH" for="des" ptType="node" refType="h" refFor="des" refForName="txOne"/>
+      <dgm:constr type="primFontSz" for="des" forName="txOne" val="65"/>
+      <dgm:constr type="primFontSz" for="des" forName="txTwo" val="65"/>
+      <dgm:constr type="primFontSz" for="des" forName="txTwo" refType="primFontSz" refFor="des" refForName="txOne" op="lte"/>
+      <dgm:constr type="primFontSz" for="des" forName="txThree" val="65"/>
+      <dgm:constr type="primFontSz" for="des" forName="txThree" refType="primFontSz" refFor="des" refForName="txOne" op="lte"/>
+      <dgm:constr type="primFontSz" for="des" forName="txThree" refType="primFontSz" refFor="des" refForName="txTwo" op="lte"/>
+      <dgm:constr type="primFontSz" for="des" forName="txFour" val="65"/>
+      <dgm:constr type="primFontSz" for="des" forName="txFour" refType="primFontSz" refFor="des" refForName="txOne" op="lte"/>
+      <dgm:constr type="primFontSz" for="des" forName="txFour" refType="primFontSz" refFor="des" refForName="txTwo" op="lte"/>
+      <dgm:constr type="primFontSz" for="des" forName="txFour" refType="primFontSz" refFor="des" refForName="txThree" op="lte"/>
+      <dgm:constr type="w" for="des" forName="sibSpaceOne" refType="w" fact="0.168"/>
+      <dgm:constr type="w" for="des" forName="sibSpaceTwo" refType="w" refFor="des" refForName="sibSpaceOne" op="equ" fact="0.5"/>
+      <dgm:constr type="w" for="des" forName="sibSpaceThree" refType="w" refFor="des" refForName="sibSpaceTwo" op="equ" fact="0.5"/>
+      <dgm:constr type="w" for="des" forName="sibSpaceFour" refType="w" refFor="des" refForName="sibSpaceThree" op="equ" fact="0.5"/>
+      <dgm:constr type="h" for="des" forName="parTransOne" refType="w" fact="0.056"/>
+      <dgm:constr type="h" for="des" forName="parTransTwo" refType="h" refFor="des" refForName="parTransOne" op="equ"/>
+      <dgm:constr type="h" for="des" forName="parTransThree" refType="h" refFor="des" refForName="parTransTwo" op="equ"/>
+      <dgm:constr type="h" for="des" forName="parTransFour" refType="h" refFor="des" refForName="parTransThree" op="equ"/>
+    </dgm:constrLst>
+    <dgm:ruleLst/>
+    <dgm:forEach name="Name4" axis="ch" ptType="node">
+      <dgm:layoutNode name="vertOne">
+        <dgm:alg type="lin">
+          <dgm:param type="linDir" val="fromT"/>
+        </dgm:alg>
+        <dgm:shape xmlns:r="http://schemas.openxmlformats.org/officeDocument/2006/relationships" r:blip="">
+          <dgm:adjLst/>
+        </dgm:shape>
+        <dgm:presOf/>
+        <dgm:constrLst>
+          <dgm:constr type="w" for="ch" forName="txOne" refType="w" refFor="ch" refForName="horzOne" op="gte"/>
+        </dgm:constrLst>
+        <dgm:ruleLst/>
+        <dgm:layoutNode name="txOne" styleLbl="node0">
+          <dgm:varLst>
+            <dgm:chPref val="3"/>
+          </dgm:varLst>
+          <dgm:alg type="tx"/>
+          <dgm:shape xmlns:r="http://schemas.openxmlformats.org/officeDocument/2006/relationships" type="roundRect" r:blip="">
+            <dgm:adjLst>
+              <dgm:adj idx="1" val="0.1"/>
+            </dgm:adjLst>
+          </dgm:shape>
+          <dgm:presOf axis="self"/>
+          <dgm:constrLst>
+            <dgm:constr type="tMarg" refType="primFontSz" fact="0.3"/>
+            <dgm:constr type="bMarg" refType="primFontSz" fact="0.3"/>
+            <dgm:constr type="lMarg" refType="primFontSz" fact="0.3"/>
+            <dgm:constr type="rMarg" refType="primFontSz" fact="0.3"/>
+          </dgm:constrLst>
+          <dgm:ruleLst>
+            <dgm:rule type="primFontSz" val="5" fact="NaN" max="NaN"/>
+          </dgm:ruleLst>
+        </dgm:layoutNode>
+        <dgm:choose name="Name5">
+          <dgm:if name="Name6" axis="des" ptType="node" func="cnt" op="gt" val="0">
+            <dgm:layoutNode name="parTransOne">
+              <dgm:alg type="sp"/>
+              <dgm:shape xmlns:r="http://schemas.openxmlformats.org/officeDocument/2006/relationships" r:blip="">
+                <dgm:adjLst/>
+              </dgm:shape>
+              <dgm:presOf/>
+              <dgm:constrLst/>
+              <dgm:ruleLst/>
+            </dgm:layoutNode>
+          </dgm:if>
+          <dgm:else name="Name7"/>
+        </dgm:choose>
+        <dgm:layoutNode name="horzOne">
+          <dgm:choose name="Name8">
+            <dgm:if name="Name9" func="var" arg="dir" op="equ" val="norm">
+              <dgm:alg type="lin">
+                <dgm:param type="linDir" val="fromL"/>
+                <dgm:param type="nodeVertAlign" val="t"/>
+              </dgm:alg>
+            </dgm:if>
+            <dgm:else name="Name10">
+              <dgm:alg type="lin">
+                <dgm:param type="linDir" val="fromR"/>
+                <dgm:param type="nodeVertAlign" val="t"/>
+              </dgm:alg>
+            </dgm:else>
+          </dgm:choose>
+          <dgm:shape xmlns:r="http://schemas.openxmlformats.org/officeDocument/2006/relationships" r:blip="">
+            <dgm:adjLst/>
+          </dgm:shape>
+          <dgm:presOf/>
+          <dgm:constrLst/>
+          <dgm:ruleLst>
+            <dgm:rule type="w" val="INF" fact="NaN" max="NaN"/>
+          </dgm:ruleLst>
+          <dgm:forEach name="Name11" axis="ch" ptType="node">
+            <dgm:layoutNode name="vertTwo">
+              <dgm:alg type="lin">
+                <dgm:param type="linDir" val="fromT"/>
+              </dgm:alg>
+              <dgm:shape xmlns:r="http://schemas.openxmlformats.org/officeDocument/2006/relationships" r:blip="">
+                <dgm:adjLst/>
+              </dgm:shape>
+              <dgm:presOf/>
+              <dgm:constrLst>
+                <dgm:constr type="w" for="ch" forName="txTwo" refType="w" refFor="ch" refForName="horzTwo" op="gte"/>
+              </dgm:constrLst>
+              <dgm:ruleLst/>
+              <dgm:layoutNode name="txTwo">
+                <dgm:varLst>
+                  <dgm:chPref val="3"/>
+                </dgm:varLst>
+                <dgm:alg type="tx"/>
+                <dgm:shape xmlns:r="http://schemas.openxmlformats.org/officeDocument/2006/relationships" type="roundRect" r:blip="">
+                  <dgm:adjLst>
+                    <dgm:adj idx="1" val="0.1"/>
+                  </dgm:adjLst>
+                </dgm:shape>
+                <dgm:presOf axis="self"/>
+                <dgm:constrLst>
+                  <dgm:constr type="userH"/>
+                  <dgm:constr type="h" refType="userH"/>
+                  <dgm:constr type="tMarg" refType="primFontSz" fact="0.3"/>
+                  <dgm:constr type="bMarg" refType="primFontSz" fact="0.3"/>
+                  <dgm:constr type="lMarg" refType="primFontSz" fact="0.3"/>
+                  <dgm:constr type="rMarg" refType="primFontSz" fact="0.3"/>
+                </dgm:constrLst>
+                <dgm:ruleLst>
+                  <dgm:rule type="primFontSz" val="5" fact="NaN" max="NaN"/>
+                </dgm:ruleLst>
+              </dgm:layoutNode>
+              <dgm:choose name="Name12">
+                <dgm:if name="Name13" axis="des" ptType="node" func="cnt" op="gt" val="0">
+                  <dgm:layoutNode name="parTransTwo">
+                    <dgm:alg type="sp"/>
+                    <dgm:shape xmlns:r="http://schemas.openxmlformats.org/officeDocument/2006/relationships" r:blip="">
+                      <dgm:adjLst/>
+                    </dgm:shape>
+                    <dgm:presOf/>
+                    <dgm:constrLst/>
+                    <dgm:ruleLst/>
+                  </dgm:layoutNode>
+                </dgm:if>
+                <dgm:else name="Name14"/>
+              </dgm:choose>
+              <dgm:layoutNode name="horzTwo">
+                <dgm:choose name="Name15">
+                  <dgm:if name="Name16" func="var" arg="dir" op="equ" val="norm">
+                    <dgm:alg type="lin">
+                      <dgm:param type="linDir" val="fromL"/>
+                      <dgm:param type="nodeVertAlign" val="t"/>
+                    </dgm:alg>
+                  </dgm:if>
+                  <dgm:else name="Name17">
+                    <dgm:alg type="lin">
+                      <dgm:param type="linDir" val="fromR"/>
+                      <dgm:param type="nodeVertAlign" val="t"/>
+                    </dgm:alg>
+                  </dgm:else>
+                </dgm:choose>
+                <dgm:shape xmlns:r="http://schemas.openxmlformats.org/officeDocument/2006/relationships" r:blip="">
+                  <dgm:adjLst/>
+                </dgm:shape>
+                <dgm:presOf/>
+                <dgm:constrLst/>
+                <dgm:ruleLst>
+                  <dgm:rule type="w" val="INF" fact="NaN" max="NaN"/>
+                </dgm:ruleLst>
+                <dgm:forEach name="Name18" axis="ch" ptType="node">
+                  <dgm:layoutNode name="vertThree">
+                    <dgm:alg type="lin">
+                      <dgm:param type="linDir" val="fromT"/>
+                    </dgm:alg>
+                    <dgm:shape xmlns:r="http://schemas.openxmlformats.org/officeDocument/2006/relationships" r:blip="">
+                      <dgm:adjLst/>
+                    </dgm:shape>
+                    <dgm:presOf/>
+                    <dgm:constrLst>
+                      <dgm:constr type="w" for="ch" forName="txThree" refType="w" refFor="ch" refForName="horzThree" op="gte"/>
+                    </dgm:constrLst>
+                    <dgm:ruleLst/>
+                    <dgm:layoutNode name="txThree">
+                      <dgm:varLst>
+                        <dgm:chPref val="3"/>
+                      </dgm:varLst>
+                      <dgm:alg type="tx"/>
+                      <dgm:shape xmlns:r="http://schemas.openxmlformats.org/officeDocument/2006/relationships" type="roundRect" r:blip="">
+                        <dgm:adjLst>
+                          <dgm:adj idx="1" val="0.1"/>
+                        </dgm:adjLst>
+                      </dgm:shape>
+                      <dgm:presOf axis="self"/>
+                      <dgm:constrLst>
+                        <dgm:constr type="userH"/>
+                        <dgm:constr type="h" refType="userH"/>
+                        <dgm:constr type="tMarg" refType="primFontSz" fact="0.3"/>
+                        <dgm:constr type="bMarg" refType="primFontSz" fact="0.3"/>
+                        <dgm:constr type="lMarg" refType="primFontSz" fact="0.3"/>
+                        <dgm:constr type="rMarg" refType="primFontSz" fact="0.3"/>
+                      </dgm:constrLst>
+                      <dgm:ruleLst>
+                        <dgm:rule type="primFontSz" val="5" fact="NaN" max="NaN"/>
+                      </dgm:ruleLst>
+                    </dgm:layoutNode>
+                    <dgm:choose name="Name19">
+                      <dgm:if name="Name20" axis="des" ptType="node" func="cnt" op="gt" val="0">
+                        <dgm:layoutNode name="parTransThree">
+                          <dgm:alg type="sp"/>
+                          <dgm:shape xmlns:r="http://schemas.openxmlformats.org/officeDocument/2006/relationships" r:blip="">
+                            <dgm:adjLst/>
+                          </dgm:shape>
+                          <dgm:presOf/>
+                          <dgm:constrLst/>
+                          <dgm:ruleLst/>
+                        </dgm:layoutNode>
+                      </dgm:if>
+                      <dgm:else name="Name21"/>
+                    </dgm:choose>
+                    <dgm:layoutNode name="horzThree">
+                      <dgm:choose name="Name22">
+                        <dgm:if name="Name23" func="var" arg="dir" op="equ" val="norm">
+                          <dgm:alg type="lin">
+                            <dgm:param type="linDir" val="fromL"/>
+                            <dgm:param type="nodeVertAlign" val="t"/>
+                          </dgm:alg>
+                        </dgm:if>
+                        <dgm:else name="Name24">
+                          <dgm:alg type="lin">
+                            <dgm:param type="linDir" val="fromR"/>
+                            <dgm:param type="nodeVertAlign" val="t"/>
+                          </dgm:alg>
+                        </dgm:else>
+                      </dgm:choose>
+                      <dgm:shape xmlns:r="http://schemas.openxmlformats.org/officeDocument/2006/relationships" r:blip="">
+                        <dgm:adjLst/>
+                      </dgm:shape>
+                      <dgm:presOf/>
+                      <dgm:constrLst/>
+                      <dgm:ruleLst>
+                        <dgm:rule type="w" val="INF" fact="NaN" max="NaN"/>
+                      </dgm:ruleLst>
+                      <dgm:forEach name="repeat" axis="ch" ptType="node">
+                        <dgm:layoutNode name="vertFour">
+                          <dgm:varLst>
+                            <dgm:chPref val="3"/>
+                          </dgm:varLst>
+                          <dgm:alg type="lin">
+                            <dgm:param type="linDir" val="fromT"/>
+                          </dgm:alg>
+                          <dgm:shape xmlns:r="http://schemas.openxmlformats.org/officeDocument/2006/relationships" r:blip="">
+                            <dgm:adjLst/>
+                          </dgm:shape>
+                          <dgm:presOf/>
+                          <dgm:constrLst>
+                            <dgm:constr type="w" for="ch" forName="txFour" refType="w" refFor="ch" refForName="horzFour" op="gte"/>
+                          </dgm:constrLst>
+                          <dgm:ruleLst/>
+                          <dgm:layoutNode name="txFour">
+                            <dgm:varLst>
+                              <dgm:chPref val="3"/>
+                            </dgm:varLst>
+                            <dgm:alg type="tx"/>
+                            <dgm:shape xmlns:r="http://schemas.openxmlformats.org/officeDocument/2006/relationships" type="roundRect" r:blip="">
+                              <dgm:adjLst>
+                                <dgm:adj idx="1" val="0.1"/>
+                              </dgm:adjLst>
+                            </dgm:shape>
+                            <dgm:presOf axis="self"/>
+                            <dgm:constrLst>
+                              <dgm:constr type="userH"/>
+                              <dgm:constr type="h" refType="userH"/>
+                              <dgm:constr type="tMarg" refType="primFontSz" fact="0.3"/>
+                              <dgm:constr type="bMarg" refType="primFontSz" fact="0.3"/>
+                              <dgm:constr type="lMarg" refType="primFontSz" fact="0.3"/>
+                              <dgm:constr type="rMarg" refType="primFontSz" fact="0.3"/>
+                            </dgm:constrLst>
+                            <dgm:ruleLst>
+                              <dgm:rule type="primFontSz" val="5" fact="NaN" max="NaN"/>
+                            </dgm:ruleLst>
+                          </dgm:layoutNode>
+                          <dgm:choose name="Name25">
+                            <dgm:if name="Name26" axis="des" ptType="node" func="cnt" op="gt" val="0">
+                              <dgm:layoutNode name="parTransFour">
+                                <dgm:alg type="sp"/>
+                                <dgm:shape xmlns:r="http://schemas.openxmlformats.org/officeDocument/2006/relationships" r:blip="">
+                                  <dgm:adjLst/>
+                                </dgm:shape>
+                                <dgm:presOf/>
+                                <dgm:constrLst/>
+                                <dgm:ruleLst/>
+                              </dgm:layoutNode>
+                            </dgm:if>
+                            <dgm:else name="Name27"/>
+                          </dgm:choose>
+                          <dgm:layoutNode name="horzFour">
+                            <dgm:choose name="Name28">
+                              <dgm:if name="Name29" func="var" arg="dir" op="equ" val="norm">
+                                <dgm:alg type="lin">
+                                  <dgm:param type="linDir" val="fromL"/>
+                                  <dgm:param type="nodeVertAlign" val="t"/>
+                                </dgm:alg>
+                              </dgm:if>
+                              <dgm:else name="Name30">
+                                <dgm:alg type="lin">
+                                  <dgm:param type="linDir" val="fromR"/>
+                                  <dgm:param type="nodeVertAlign" val="t"/>
+                                </dgm:alg>
+                              </dgm:else>
+                            </dgm:choose>
+                            <dgm:shape xmlns:r="http://schemas.openxmlformats.org/officeDocument/2006/relationships" r:blip="">
+                              <dgm:adjLst/>
+                            </dgm:shape>
+                            <dgm:presOf/>
+                            <dgm:constrLst/>
+                            <dgm:ruleLst>
+                              <dgm:rule type="w" val="INF" fact="NaN" max="NaN"/>
+                            </dgm:ruleLst>
+                            <dgm:forEach name="Name31" ref="repeat"/>
+                          </dgm:layoutNode>
+                        </dgm:layoutNode>
+                        <dgm:choose name="Name32">
+                          <dgm:if name="Name33" axis="self" ptType="node" func="revPos" op="gte" val="2">
+                            <dgm:forEach name="Name34" axis="followSib" ptType="sibTrans" cnt="1">
+                              <dgm:layoutNode name="sibSpaceFour">
+                                <dgm:alg type="sp"/>
+                                <dgm:shape xmlns:r="http://schemas.openxmlformats.org/officeDocument/2006/relationships" r:blip="">
+                                  <dgm:adjLst/>
+                                </dgm:shape>
+                                <dgm:presOf/>
+                                <dgm:constrLst/>
+                                <dgm:ruleLst/>
+                              </dgm:layoutNode>
+                            </dgm:forEach>
+                          </dgm:if>
+                          <dgm:else name="Name35"/>
+                        </dgm:choose>
+                      </dgm:forEach>
+                    </dgm:layoutNode>
+                  </dgm:layoutNode>
+                  <dgm:choose name="Name36">
+                    <dgm:if name="Name37" axis="self" ptType="node" func="revPos" op="gte" val="2">
+                      <dgm:forEach name="Name38" axis="followSib" ptType="sibTrans" cnt="1">
+                        <dgm:layoutNode name="sibSpaceThree">
+                          <dgm:alg type="sp"/>
+                          <dgm:shape xmlns:r="http://schemas.openxmlformats.org/officeDocument/2006/relationships" r:blip="">
+                            <dgm:adjLst/>
+                          </dgm:shape>
+                          <dgm:presOf/>
+                          <dgm:constrLst/>
+                          <dgm:ruleLst/>
+                        </dgm:layoutNode>
+                      </dgm:forEach>
+                    </dgm:if>
+                    <dgm:else name="Name39"/>
+                  </dgm:choose>
+                </dgm:forEach>
+              </dgm:layoutNode>
+            </dgm:layoutNode>
+            <dgm:choose name="Name40">
+              <dgm:if name="Name41" axis="self" ptType="node" func="revPos" op="gte" val="2">
+                <dgm:forEach name="Name42" axis="followSib" ptType="sibTrans" cnt="1">
+                  <dgm:layoutNode name="sibSpaceTwo">
+                    <dgm:alg type="sp"/>
+                    <dgm:shape xmlns:r="http://schemas.openxmlformats.org/officeDocument/2006/relationships" r:blip="">
+                      <dgm:adjLst/>
+                    </dgm:shape>
+                    <dgm:presOf/>
+                    <dgm:constrLst/>
+                    <dgm:ruleLst/>
+                  </dgm:layoutNode>
+                </dgm:forEach>
+              </dgm:if>
+              <dgm:else name="Name43"/>
+            </dgm:choose>
+          </dgm:forEach>
+        </dgm:layoutNode>
+      </dgm:layoutNode>
+      <dgm:choose name="Name44">
+        <dgm:if name="Name45" axis="self" ptType="node" func="revPos" op="gte" val="2">
+          <dgm:forEach name="Name46" axis="followSib" ptType="sibTrans" cnt="1">
+            <dgm:layoutNode name="sibSpaceOne">
+              <dgm:alg type="sp"/>
+              <dgm:shape xmlns:r="http://schemas.openxmlformats.org/officeDocument/2006/relationships" r:blip="">
+                <dgm:adjLst/>
+              </dgm:shape>
+              <dgm:presOf/>
+              <dgm:constrLst/>
+              <dgm:ruleLst/>
+            </dgm:layoutNode>
+          </dgm:forEach>
+        </dgm:if>
+        <dgm:else name="Name47"/>
+      </dgm:choose>
+    </dgm:forEach>
+  </dgm:layoutNode>
+</dgm:layoutDef>
+</file>
+
 <file path=ppt/diagrams/quickStyle1.xml><?xml version="1.0" encoding="utf-8"?>
+<dgm:styleDef xmlns:dgm="http://schemas.openxmlformats.org/drawingml/2006/diagram" xmlns:a="http://schemas.openxmlformats.org/drawingml/2006/main" uniqueId="urn:microsoft.com/office/officeart/2005/8/quickstyle/simple1">
+  <dgm:title val=""/>
+  <dgm:desc val=""/>
+  <dgm:catLst>
+    <dgm:cat type="simple" pri="10100"/>
+  </dgm:catLst>
+  <dgm:scene3d>
+    <a:camera prst="orthographicFront"/>
+    <a:lightRig rig="threePt" dir="t"/>
+  </dgm:scene3d>
+  <dgm:styleLbl name="node0">
+    <dgm:scene3d>
+      <a:camera prst="orthographicFront"/>
+      <a:lightRig rig="threePt" dir="t"/>
+    </dgm:scene3d>
+    <dgm:sp3d/>
+    <dgm:txPr/>
+    <dgm:style>
+      <a:lnRef idx="2">
+        <a:scrgbClr r="0" g="0" b="0"/>
+      </a:lnRef>
+      <a:fillRef idx="1">
+        <a:scrgbClr r="0" g="0" b="0"/>
+      </a:fillRef>
+      <a:effectRef idx="0">
+        <a:scrgbClr r="0" g="0" b="0"/>
+      </a:effectRef>
+      <a:fontRef idx="minor">
+        <a:schemeClr val="lt1"/>
+      </a:fontRef>
+    </dgm:style>
+  </dgm:styleLbl>
+  <dgm:styleLbl name="lnNode1">
+    <dgm:scene3d>
+      <a:camera prst="orthographicFront"/>
+      <a:lightRig rig="threePt" dir="t"/>
+    </dgm:scene3d>
+    <dgm:sp3d/>
+    <dgm:txPr/>
+    <dgm:style>
+      <a:lnRef idx="2">
+        <a:scrgbClr r="0" g="0" b="0"/>
+      </a:lnRef>
+      <a:fillRef idx="1">
+        <a:scrgbClr r="0" g="0" b="0"/>
+      </a:fillRef>
+      <a:effectRef idx="0">
+        <a:scrgbClr r="0" g="0" b="0"/>
+      </a:effectRef>
+      <a:fontRef idx="minor">
+        <a:schemeClr val="lt1"/>
+      </a:fontRef>
+    </dgm:style>
+  </dgm:styleLbl>
+  <dgm:styleLbl name="vennNode1">
+    <dgm:scene3d>
+      <a:camera prst="orthographicFront"/>
+      <a:lightRig rig="threePt" dir="t"/>
+    </dgm:scene3d>
+    <dgm:sp3d/>
+    <dgm:txPr/>
+    <dgm:style>
+      <a:lnRef idx="2">
+        <a:scrgbClr r="0" g="0" b="0"/>
+      </a:lnRef>
+      <a:fillRef idx="1">
+        <a:scrgbClr r="0" g="0" b="0"/>
+      </a:fillRef>
+      <a:effectRef idx="0">
+        <a:scrgbClr r="0" g="0" b="0"/>
+      </a:effectRef>
+      <a:fontRef idx="minor">
+        <a:schemeClr val="tx1"/>
+      </a:fontRef>
+    </dgm:style>
+  </dgm:styleLbl>
+  <dgm:styleLbl name="alignNode1">
+    <dgm:scene3d>
+      <a:camera prst="orthographicFront"/>
+      <a:lightRig rig="threePt" dir="t"/>
+    </dgm:scene3d>
+    <dgm:sp3d/>
+    <dgm:txPr/>
+    <dgm:style>
+      <a:lnRef idx="2">
+        <a:scrgbClr r="0" g="0" b="0"/>
+      </a:lnRef>
+      <a:fillRef idx="1">
+        <a:scrgbClr r="0" g="0" b="0"/>
+      </a:fillRef>
+      <a:effectRef idx="0">
+        <a:scrgbClr r="0" g="0" b="0"/>
+      </a:effectRef>
+      <a:fontRef idx="minor">
+        <a:schemeClr val="lt1"/>
+      </a:fontRef>
+    </dgm:style>
+  </dgm:styleLbl>
+  <dgm:styleLbl name="node1">
+    <dgm:scene3d>
+      <a:camera prst="orthographicFront"/>
+      <a:lightRig rig="threePt" dir="t"/>
+    </dgm:scene3d>
+    <dgm:sp3d/>
+    <dgm:txPr/>
+    <dgm:style>
+      <a:lnRef idx="2">
+        <a:scrgbClr r="0" g="0" b="0"/>
+      </a:lnRef>
+      <a:fillRef idx="1">
+        <a:scrgbClr r="0" g="0" b="0"/>
+      </a:fillRef>
+      <a:effectRef idx="0">
+        <a:scrgbClr r="0" g="0" b="0"/>
+      </a:effectRef>
+      <a:fontRef idx="minor">
+        <a:schemeClr val="lt1"/>
+      </a:fontRef>
+    </dgm:style>
+  </dgm:styleLbl>
+  <dgm:styleLbl name="node2">
+    <dgm:scene3d>
+      <a:camera prst="orthographicFront"/>
+      <a:lightRig rig="threePt" dir="t"/>
+    </dgm:scene3d>
+    <dgm:sp3d/>
+    <dgm:txPr/>
+    <dgm:style>
+      <a:lnRef idx="2">
+        <a:scrgbClr r="0" g="0" b="0"/>
+      </a:lnRef>
+      <a:fillRef idx="1">
+        <a:scrgbClr r="0" g="0" b="0"/>
+      </a:fillRef>
+      <a:effectRef idx="0">
+        <a:scrgbClr r="0" g="0" b="0"/>
+      </a:effectRef>
+      <a:fontRef idx="minor">
+        <a:schemeClr val="lt1"/>
+      </a:fontRef>
+    </dgm:style>
+  </dgm:styleLbl>
+  <dgm:styleLbl name="node3">
+    <dgm:scene3d>
+      <a:camera prst="orthographicFront"/>
+      <a:lightRig rig="threePt" dir="t"/>
+    </dgm:scene3d>
+    <dgm:sp3d/>
+    <dgm:txPr/>
+    <dgm:style>
+      <a:lnRef idx="2">
+        <a:scrgbClr r="0" g="0" b="0"/>
+      </a:lnRef>
+      <a:fillRef idx="1">
+        <a:scrgbClr r="0" g="0" b="0"/>
+      </a:fillRef>
+      <a:effectRef idx="0">
+        <a:scrgbClr r="0" g="0" b="0"/>
+      </a:effectRef>
+      <a:fontRef idx="minor">
+        <a:schemeClr val="lt1"/>
+      </a:fontRef>
+    </dgm:style>
+  </dgm:styleLbl>
+  <dgm:styleLbl name="node4">
+    <dgm:scene3d>
+      <a:camera prst="orthographicFront"/>
+      <a:lightRig rig="threePt" dir="t"/>
+    </dgm:scene3d>
+    <dgm:sp3d/>
+    <dgm:txPr/>
+    <dgm:style>
+      <a:lnRef idx="2">
+        <a:scrgbClr r="0" g="0" b="0"/>
+      </a:lnRef>
+      <a:fillRef idx="1">
+        <a:scrgbClr r="0" g="0" b="0"/>
+      </a:fillRef>
+      <a:effectRef idx="0">
+        <a:scrgbClr r="0" g="0" b="0"/>
+      </a:effectRef>
+      <a:fontRef idx="minor">
+        <a:schemeClr val="lt1"/>
+      </a:fontRef>
+    </dgm:style>
+  </dgm:styleLbl>
+  <dgm:styleLbl name="fgImgPlace1">
+    <dgm:scene3d>
+      <a:camera prst="orthographicFront"/>
+      <a:lightRig rig="threePt" dir="t"/>
+    </dgm:scene3d>
+    <dgm:sp3d/>
+    <dgm:txPr/>
+    <dgm:style>
+      <a:lnRef idx="2">
+        <a:scrgbClr r="0" g="0" b="0"/>
+      </a:lnRef>
+      <a:fillRef idx="1">
+        <a:scrgbClr r="0" g="0" b="0"/>
+      </a:fillRef>
+      <a:effectRef idx="0">
+        <a:scrgbClr r="0" g="0" b="0"/>
+      </a:effectRef>
+      <a:fontRef idx="minor"/>
+    </dgm:style>
+  </dgm:styleLbl>
+  <dgm:styleLbl name="alignImgPlace1">
+    <dgm:scene3d>
+      <a:camera prst="orthographicFront"/>
+      <a:lightRig rig="threePt" dir="t"/>
+    </dgm:scene3d>
+    <dgm:sp3d/>
+    <dgm:txPr/>
+    <dgm:style>
+      <a:lnRef idx="2">
+        <a:scrgbClr r="0" g="0" b="0"/>
+      </a:lnRef>
+      <a:fillRef idx="1">
+        <a:scrgbClr r="0" g="0" b="0"/>
+      </a:fillRef>
+      <a:effectRef idx="0">
+        <a:scrgbClr r="0" g="0" b="0"/>
+      </a:effectRef>
+      <a:fontRef idx="minor"/>
+    </dgm:style>
+  </dgm:styleLbl>
+  <dgm:styleLbl name="bgImgPlace1">
+    <dgm:scene3d>
+      <a:camera prst="orthographicFront"/>
+      <a:lightRig rig="threePt" dir="t"/>
+    </dgm:scene3d>
+    <dgm:sp3d/>
+    <dgm:txPr/>
+    <dgm:style>
+      <a:lnRef idx="2">
+        <a:scrgbClr r="0" g="0" b="0"/>
+      </a:lnRef>
+      <a:fillRef idx="1">
+        <a:scrgbClr r="0" g="0" b="0"/>
+      </a:fillRef>
+      <a:effectRef idx="0">
+        <a:scrgbClr r="0" g="0" b="0"/>
+      </a:effectRef>
+      <a:fontRef idx="minor"/>
+    </dgm:style>
+  </dgm:styleLbl>
+  <dgm:styleLbl name="sibTrans2D1">
+    <dgm:scene3d>
+      <a:camera prst="orthographicFront"/>
+      <a:lightRig rig="threePt" dir="t"/>
+    </dgm:scene3d>
+    <dgm:sp3d/>
+    <dgm:txPr/>
+    <dgm:style>
+      <a:lnRef idx="0">
+        <a:scrgbClr r="0" g="0" b="0"/>
+      </a:lnRef>
+      <a:fillRef idx="1">
+        <a:scrgbClr r="0" g="0" b="0"/>
+      </a:fillRef>
+      <a:effectRef idx="0">
+        <a:scrgbClr r="0" g="0" b="0"/>
+      </a:effectRef>
+      <a:fontRef idx="minor">
+        <a:schemeClr val="lt1"/>
+      </a:fontRef>
+    </dgm:style>
+  </dgm:styleLbl>
+  <dgm:styleLbl name="fgSibTrans2D1">
+    <dgm:scene3d>
+      <a:camera prst="orthographicFront"/>
+      <a:lightRig rig="threePt" dir="t"/>
+    </dgm:scene3d>
+    <dgm:sp3d/>
+    <dgm:txPr/>
+    <dgm:style>
+      <a:lnRef idx="0">
+        <a:scrgbClr r="0" g="0" b="0"/>
+      </a:lnRef>
+      <a:fillRef idx="1">
+        <a:scrgbClr r="0" g="0" b="0"/>
+      </a:fillRef>
+      <a:effectRef idx="0">
+        <a:scrgbClr r="0" g="0" b="0"/>
+      </a:effectRef>
+      <a:fontRef idx="minor">
+        <a:schemeClr val="lt1"/>
+      </a:fontRef>
+    </dgm:style>
+  </dgm:styleLbl>
+  <dgm:styleLbl name="bgSibTrans2D1">
+    <dgm:scene3d>
+      <a:camera prst="orthographicFront"/>
+      <a:lightRig rig="threePt" dir="t"/>
+    </dgm:scene3d>
+    <dgm:sp3d/>
+    <dgm:txPr/>
+    <dgm:style>
+      <a:lnRef idx="0">
+        <a:scrgbClr r="0" g="0" b="0"/>
+      </a:lnRef>
+      <a:fillRef idx="1">
+        <a:scrgbClr r="0" g="0" b="0"/>
+      </a:fillRef>
+      <a:effectRef idx="0">
+        <a:scrgbClr r="0" g="0" b="0"/>
+      </a:effectRef>
+      <a:fontRef idx="minor">
+        <a:schemeClr val="lt1"/>
+      </a:fontRef>
+    </dgm:style>
+  </dgm:styleLbl>
+  <dgm:styleLbl name="sibTrans1D1">
+    <dgm:scene3d>
+      <a:camera prst="orthographicFront"/>
+      <a:lightRig rig="threePt" dir="t"/>
+    </dgm:scene3d>
+    <dgm:sp3d/>
+    <dgm:txPr/>
+    <dgm:style>
+      <a:lnRef idx="1">
+        <a:scrgbClr r="0" g="0" b="0"/>
+      </a:lnRef>
+      <a:fillRef idx="0">
+        <a:scrgbClr r="0" g="0" b="0"/>
+      </a:fillRef>
+      <a:effectRef idx="0">
+        <a:scrgbClr r="0" g="0" b="0"/>
+      </a:effectRef>
+      <a:fontRef idx="minor"/>
+    </dgm:style>
+  </dgm:styleLbl>
+  <dgm:styleLbl name="callout">
+    <dgm:scene3d>
+      <a:camera prst="orthographicFront"/>
+      <a:lightRig rig="threePt" dir="t"/>
+    </dgm:scene3d>
+    <dgm:sp3d/>
+    <dgm:txPr/>
+    <dgm:style>
+      <a:lnRef idx="2">
+        <a:scrgbClr r="0" g="0" b="0"/>
+      </a:lnRef>
+      <a:fillRef idx="1">
+        <a:scrgbClr r="0" g="0" b="0"/>
+      </a:fillRef>
+      <a:effectRef idx="0">
+        <a:scrgbClr r="0" g="0" b="0"/>
+      </a:effectRef>
+      <a:fontRef idx="minor"/>
+    </dgm:style>
+  </dgm:styleLbl>
+  <dgm:styleLbl name="asst0">
+    <dgm:scene3d>
+      <a:camera prst="orthographicFront"/>
+      <a:lightRig rig="threePt" dir="t"/>
+    </dgm:scene3d>
+    <dgm:sp3d/>
+    <dgm:txPr/>
+    <dgm:style>
+      <a:lnRef idx="2">
+        <a:scrgbClr r="0" g="0" b="0"/>
+      </a:lnRef>
+      <a:fillRef idx="1">
+        <a:scrgbClr r="0" g="0" b="0"/>
+      </a:fillRef>
+      <a:effectRef idx="0">
+        <a:scrgbClr r="0" g="0" b="0"/>
+      </a:effectRef>
+      <a:fontRef idx="minor">
+        <a:schemeClr val="lt1"/>
+      </a:fontRef>
+    </dgm:style>
+  </dgm:styleLbl>
+  <dgm:styleLbl name="asst1">
+    <dgm:scene3d>
+      <a:camera prst="orthographicFront"/>
+      <a:lightRig rig="threePt" dir="t"/>
+    </dgm:scene3d>
+    <dgm:sp3d/>
+    <dgm:txPr/>
+    <dgm:style>
+      <a:lnRef idx="2">
+        <a:scrgbClr r="0" g="0" b="0"/>
+      </a:lnRef>
+      <a:fillRef idx="1">
+        <a:scrgbClr r="0" g="0" b="0"/>
+      </a:fillRef>
+      <a:effectRef idx="0">
+        <a:scrgbClr r="0" g="0" b="0"/>
+      </a:effectRef>
+      <a:fontRef idx="minor">
+        <a:schemeClr val="lt1"/>
+      </a:fontRef>
+    </dgm:style>
+  </dgm:styleLbl>
+  <dgm:styleLbl name="asst2">
+    <dgm:scene3d>
+      <a:camera prst="orthographicFront"/>
+      <a:lightRig rig="threePt" dir="t"/>
+    </dgm:scene3d>
+    <dgm:sp3d/>
+    <dgm:txPr/>
+    <dgm:style>
+      <a:lnRef idx="2">
+        <a:scrgbClr r="0" g="0" b="0"/>
+      </a:lnRef>
+      <a:fillRef idx="1">
+        <a:scrgbClr r="0" g="0" b="0"/>
+      </a:fillRef>
+      <a:effectRef idx="0">
+        <a:scrgbClr r="0" g="0" b="0"/>
+      </a:effectRef>
+      <a:fontRef idx="minor">
+        <a:schemeClr val="lt1"/>
+      </a:fontRef>
+    </dgm:style>
+  </dgm:styleLbl>
+  <dgm:styleLbl name="asst3">
+    <dgm:scene3d>
+      <a:camera prst="orthographicFront"/>
+      <a:lightRig rig="threePt" dir="t"/>
+    </dgm:scene3d>
+    <dgm:sp3d/>
+    <dgm:txPr/>
+    <dgm:style>
+      <a:lnRef idx="2">
+        <a:scrgbClr r="0" g="0" b="0"/>
+      </a:lnRef>
+      <a:fillRef idx="1">
+        <a:scrgbClr r="0" g="0" b="0"/>
+      </a:fillRef>
+      <a:effectRef idx="0">
+        <a:scrgbClr r="0" g="0" b="0"/>
+      </a:effectRef>
+      <a:fontRef idx="minor">
+        <a:schemeClr val="lt1"/>
+      </a:fontRef>
+    </dgm:style>
+  </dgm:styleLbl>
+  <dgm:styleLbl name="asst4">
+    <dgm:scene3d>
+      <a:camera prst="orthographicFront"/>
+      <a:lightRig rig="threePt" dir="t"/>
+    </dgm:scene3d>
+    <dgm:sp3d/>
+    <dgm:txPr/>
+    <dgm:style>
+      <a:lnRef idx="2">
+        <a:scrgbClr r="0" g="0" b="0"/>
+      </a:lnRef>
+      <a:fillRef idx="1">
+        <a:scrgbClr r="0" g="0" b="0"/>
+      </a:fillRef>
+      <a:effectRef idx="0">
+        <a:scrgbClr r="0" g="0" b="0"/>
+      </a:effectRef>
+      <a:fontRef idx="minor">
+        <a:schemeClr val="lt1"/>
+      </a:fontRef>
+    </dgm:style>
+  </dgm:styleLbl>
+  <dgm:styleLbl name="parChTrans2D1">
+    <dgm:scene3d>
+      <a:camera prst="orthographicFront"/>
+      <a:lightRig rig="threePt" dir="t"/>
+    </dgm:scene3d>
+    <dgm:sp3d/>
+    <dgm:txPr/>
+    <dgm:style>
+      <a:lnRef idx="2">
+        <a:scrgbClr r="0" g="0" b="0"/>
+      </a:lnRef>
+      <a:fillRef idx="1">
+        <a:scrgbClr r="0" g="0" b="0"/>
+      </a:fillRef>
+      <a:effectRef idx="0">
+        <a:scrgbClr r="0" g="0" b="0"/>
+      </a:effectRef>
+      <a:fontRef idx="minor">
+        <a:schemeClr val="lt1"/>
+      </a:fontRef>
+    </dgm:style>
+  </dgm:styleLbl>
+  <dgm:styleLbl name="parChTrans2D2">
+    <dgm:scene3d>
+      <a:camera prst="orthographicFront"/>
+      <a:lightRig rig="threePt" dir="t"/>
+    </dgm:scene3d>
+    <dgm:sp3d/>
+    <dgm:txPr/>
+    <dgm:style>
+      <a:lnRef idx="2">
+        <a:scrgbClr r="0" g="0" b="0"/>
+      </a:lnRef>
+      <a:fillRef idx="1">
+        <a:scrgbClr r="0" g="0" b="0"/>
+      </a:fillRef>
+      <a:effectRef idx="0">
+        <a:scrgbClr r="0" g="0" b="0"/>
+      </a:effectRef>
+      <a:fontRef idx="minor">
+        <a:schemeClr val="lt1"/>
+      </a:fontRef>
+    </dgm:style>
+  </dgm:styleLbl>
+  <dgm:styleLbl name="parChTrans2D3">
+    <dgm:scene3d>
+      <a:camera prst="orthographicFront"/>
+      <a:lightRig rig="threePt" dir="t"/>
+    </dgm:scene3d>
+    <dgm:sp3d/>
+    <dgm:txPr/>
+    <dgm:style>
+      <a:lnRef idx="2">
+        <a:scrgbClr r="0" g="0" b="0"/>
+      </a:lnRef>
+      <a:fillRef idx="1">
+        <a:scrgbClr r="0" g="0" b="0"/>
+      </a:fillRef>
+      <a:effectRef idx="0">
+        <a:scrgbClr r="0" g="0" b="0"/>
+      </a:effectRef>
+      <a:fontRef idx="minor">
+        <a:schemeClr val="lt1"/>
+      </a:fontRef>
+    </dgm:style>
+  </dgm:styleLbl>
+  <dgm:styleLbl name="parChTrans2D4">
+    <dgm:scene3d>
+      <a:camera prst="orthographicFront"/>
+      <a:lightRig rig="threePt" dir="t"/>
+    </dgm:scene3d>
+    <dgm:sp3d/>
+    <dgm:txPr/>
+    <dgm:style>
+      <a:lnRef idx="2">
+        <a:scrgbClr r="0" g="0" b="0"/>
+      </a:lnRef>
+      <a:fillRef idx="1">
+        <a:scrgbClr r="0" g="0" b="0"/>
+      </a:fillRef>
+      <a:effectRef idx="0">
+        <a:scrgbClr r="0" g="0" b="0"/>
+      </a:effectRef>
+      <a:fontRef idx="minor">
+        <a:schemeClr val="lt1"/>
+      </a:fontRef>
+    </dgm:style>
+  </dgm:styleLbl>
+  <dgm:styleLbl name="parChTrans1D1">
+    <dgm:scene3d>
+      <a:camera prst="orthographicFront"/>
+      <a:lightRig rig="threePt" dir="t"/>
+    </dgm:scene3d>
+    <dgm:sp3d/>
+    <dgm:txPr/>
+    <dgm:style>
+      <a:lnRef idx="2">
+        <a:scrgbClr r="0" g="0" b="0"/>
+      </a:lnRef>
+      <a:fillRef idx="0">
+        <a:scrgbClr r="0" g="0" b="0"/>
+      </a:fillRef>
+      <a:effectRef idx="0">
+        <a:scrgbClr r="0" g="0" b="0"/>
+      </a:effectRef>
+      <a:fontRef idx="minor"/>
+    </dgm:style>
+  </dgm:styleLbl>
+  <dgm:styleLbl name="parChTrans1D2">
+    <dgm:scene3d>
+      <a:camera prst="orthographicFront"/>
+      <a:lightRig rig="threePt" dir="t"/>
+    </dgm:scene3d>
+    <dgm:sp3d/>
+    <dgm:txPr/>
+    <dgm:style>
+      <a:lnRef idx="2">
+        <a:scrgbClr r="0" g="0" b="0"/>
+      </a:lnRef>
+      <a:fillRef idx="0">
+        <a:scrgbClr r="0" g="0" b="0"/>
+      </a:fillRef>
+      <a:effectRef idx="0">
+        <a:scrgbClr r="0" g="0" b="0"/>
+      </a:effectRef>
+      <a:fontRef idx="minor"/>
+    </dgm:style>
+  </dgm:styleLbl>
+  <dgm:styleLbl name="parChTrans1D3">
+    <dgm:scene3d>
+      <a:camera prst="orthographicFront"/>
+      <a:lightRig rig="threePt" dir="t"/>
+    </dgm:scene3d>
+    <dgm:sp3d/>
+    <dgm:txPr/>
+    <dgm:style>
+      <a:lnRef idx="2">
+        <a:scrgbClr r="0" g="0" b="0"/>
+      </a:lnRef>
+      <a:fillRef idx="0">
+        <a:scrgbClr r="0" g="0" b="0"/>
+      </a:fillRef>
+      <a:effectRef idx="0">
+        <a:scrgbClr r="0" g="0" b="0"/>
+      </a:effectRef>
+      <a:fontRef idx="minor"/>
+    </dgm:style>
+  </dgm:styleLbl>
+  <dgm:styleLbl name="parChTrans1D4">
+    <dgm:scene3d>
+      <a:camera prst="orthographicFront"/>
+      <a:lightRig rig="threePt" dir="t"/>
+    </dgm:scene3d>
+    <dgm:sp3d/>
+    <dgm:txPr/>
+    <dgm:style>
+      <a:lnRef idx="2">
+        <a:scrgbClr r="0" g="0" b="0"/>
+      </a:lnRef>
+      <a:fillRef idx="0">
+        <a:scrgbClr r="0" g="0" b="0"/>
+      </a:fillRef>
+      <a:effectRef idx="0">
+        <a:scrgbClr r="0" g="0" b="0"/>
+      </a:effectRef>
+      <a:fontRef idx="minor"/>
+    </dgm:style>
+  </dgm:styleLbl>
+  <dgm:styleLbl name="fgAcc1">
+    <dgm:scene3d>
+      <a:camera prst="orthographicFront"/>
+      <a:lightRig rig="threePt" dir="t"/>
+    </dgm:scene3d>
+    <dgm:sp3d/>
+    <dgm:txPr/>
+    <dgm:style>
+      <a:lnRef idx="2">
+        <a:scrgbClr r="0" g="0" b="0"/>
+      </a:lnRef>
+      <a:fillRef idx="1">
+        <a:scrgbClr r="0" g="0" b="0"/>
+      </a:fillRef>
+      <a:effectRef idx="0">
+        <a:scrgbClr r="0" g="0" b="0"/>
+      </a:effectRef>
+      <a:fontRef idx="minor"/>
+    </dgm:style>
+  </dgm:styleLbl>
+  <dgm:styleLbl name="conFgAcc1">
+    <dgm:scene3d>
+      <a:camera prst="orthographicFront"/>
+      <a:lightRig rig="threePt" dir="t"/>
+    </dgm:scene3d>
+    <dgm:sp3d/>
+    <dgm:txPr/>
+    <dgm:style>
+      <a:lnRef idx="2">
+        <a:scrgbClr r="0" g="0" b="0"/>
+      </a:lnRef>
+      <a:fillRef idx="1">
+        <a:scrgbClr r="0" g="0" b="0"/>
+      </a:fillRef>
+      <a:effectRef idx="0">
+        <a:scrgbClr r="0" g="0" b="0"/>
+      </a:effectRef>
+      <a:fontRef idx="minor"/>
+    </dgm:style>
+  </dgm:styleLbl>
+  <dgm:styleLbl name="alignAcc1">
+    <dgm:scene3d>
+      <a:camera prst="orthographicFront"/>
+      <a:lightRig rig="threePt" dir="t"/>
+    </dgm:scene3d>
+    <dgm:sp3d/>
+    <dgm:txPr/>
+    <dgm:style>
+      <a:lnRef idx="2">
+        <a:scrgbClr r="0" g="0" b="0"/>
+      </a:lnRef>
+      <a:fillRef idx="1">
+        <a:scrgbClr r="0" g="0" b="0"/>
+      </a:fillRef>
+      <a:effectRef idx="0">
+        <a:scrgbClr r="0" g="0" b="0"/>
+      </a:effectRef>
+      <a:fontRef idx="minor"/>
+    </dgm:style>
+  </dgm:styleLbl>
+  <dgm:styleLbl name="trAlignAcc1">
+    <dgm:scene3d>
+      <a:camera prst="orthographicFront"/>
+      <a:lightRig rig="threePt" dir="t"/>
+    </dgm:scene3d>
+    <dgm:sp3d/>
+    <dgm:txPr/>
+    <dgm:style>
+      <a:lnRef idx="1">
+        <a:scrgbClr r="0" g="0" b="0"/>
+      </a:lnRef>
+      <a:fillRef idx="1">
+        <a:scrgbClr r="0" g="0" b="0"/>
+      </a:fillRef>
+      <a:effectRef idx="0">
+        <a:scrgbClr r="0" g="0" b="0"/>
+      </a:effectRef>
+      <a:fontRef idx="minor"/>
+    </dgm:style>
+  </dgm:styleLbl>
+  <dgm:styleLbl name="bgAcc1">
+    <dgm:scene3d>
+      <a:camera prst="orthographicFront"/>
+      <a:lightRig rig="threePt" dir="t"/>
+    </dgm:scene3d>
+    <dgm:sp3d/>
+    <dgm:txPr/>
+    <dgm:style>
+      <a:lnRef idx="2">
+        <a:scrgbClr r="0" g="0" b="0"/>
+      </a:lnRef>
+      <a:fillRef idx="1">
+        <a:scrgbClr r="0" g="0" b="0"/>
+      </a:fillRef>
+      <a:effectRef idx="0">
+        <a:scrgbClr r="0" g="0" b="0"/>
+      </a:effectRef>
+      <a:fontRef idx="minor"/>
+    </dgm:style>
+  </dgm:styleLbl>
+  <dgm:styleLbl name="solidFgAcc1">
+    <dgm:scene3d>
+      <a:camera prst="orthographicFront"/>
+      <a:lightRig rig="threePt" dir="t"/>
+    </dgm:scene3d>
+    <dgm:sp3d/>
+    <dgm:txPr/>
+    <dgm:style>
+      <a:lnRef idx="2">
+        <a:scrgbClr r="0" g="0" b="0"/>
+      </a:lnRef>
+      <a:fillRef idx="1">
+        <a:scrgbClr r="0" g="0" b="0"/>
+      </a:fillRef>
+      <a:effectRef idx="0">
+        <a:scrgbClr r="0" g="0" b="0"/>
+      </a:effectRef>
+      <a:fontRef idx="minor"/>
+    </dgm:style>
+  </dgm:styleLbl>
+  <dgm:styleLbl name="solidAlignAcc1">
+    <dgm:scene3d>
+      <a:camera prst="orthographicFront"/>
+      <a:lightRig rig="threePt" dir="t"/>
+    </dgm:scene3d>
+    <dgm:sp3d/>
+    <dgm:txPr/>
+    <dgm:style>
+      <a:lnRef idx="2">
+        <a:scrgbClr r="0" g="0" b="0"/>
+      </a:lnRef>
+      <a:fillRef idx="1">
+        <a:scrgbClr r="0" g="0" b="0"/>
+      </a:fillRef>
+      <a:effectRef idx="0">
+        <a:scrgbClr r="0" g="0" b="0"/>
+      </a:effectRef>
+      <a:fontRef idx="minor"/>
+    </dgm:style>
+  </dgm:styleLbl>
+  <dgm:styleLbl name="solidBgAcc1">
+    <dgm:scene3d>
+      <a:camera prst="orthographicFront"/>
+      <a:lightRig rig="threePt" dir="t"/>
+    </dgm:scene3d>
+    <dgm:sp3d/>
+    <dgm:txPr/>
+    <dgm:style>
+      <a:lnRef idx="2">
+        <a:scrgbClr r="0" g="0" b="0"/>
+      </a:lnRef>
+      <a:fillRef idx="1">
+        <a:scrgbClr r="0" g="0" b="0"/>
+      </a:fillRef>
+      <a:effectRef idx="0">
+        <a:scrgbClr r="0" g="0" b="0"/>
+      </a:effectRef>
+      <a:fontRef idx="minor"/>
+    </dgm:style>
+  </dgm:styleLbl>
+  <dgm:styleLbl name="fgAccFollowNode1">
+    <dgm:scene3d>
+      <a:camera prst="orthographicFront"/>
+      <a:lightRig rig="threePt" dir="t"/>
+    </dgm:scene3d>
+    <dgm:sp3d/>
+    <dgm:txPr/>
+    <dgm:style>
+      <a:lnRef idx="2">
+        <a:scrgbClr r="0" g="0" b="0"/>
+      </a:lnRef>
+      <a:fillRef idx="1">
+        <a:scrgbClr r="0" g="0" b="0"/>
+      </a:fillRef>
+      <a:effectRef idx="0">
+        <a:scrgbClr r="0" g="0" b="0"/>
+      </a:effectRef>
+      <a:fontRef idx="minor"/>
+    </dgm:style>
+  </dgm:styleLbl>
+  <dgm:styleLbl name="alignAccFollowNode1">
+    <dgm:scene3d>
+      <a:camera prst="orthographicFront"/>
+      <a:lightRig rig="threePt" dir="t"/>
+    </dgm:scene3d>
+    <dgm:sp3d/>
+    <dgm:txPr/>
+    <dgm:style>
+      <a:lnRef idx="2">
+        <a:scrgbClr r="0" g="0" b="0"/>
+      </a:lnRef>
+      <a:fillRef idx="1">
+        <a:scrgbClr r="0" g="0" b="0"/>
+      </a:fillRef>
+      <a:effectRef idx="0">
+        <a:scrgbClr r="0" g="0" b="0"/>
+      </a:effectRef>
+      <a:fontRef idx="minor"/>
+    </dgm:style>
+  </dgm:styleLbl>
+  <dgm:styleLbl name="bgAccFollowNode1">
+    <dgm:scene3d>
+      <a:camera prst="orthographicFront"/>
+      <a:lightRig rig="threePt" dir="t"/>
+    </dgm:scene3d>
+    <dgm:sp3d/>
+    <dgm:txPr/>
+    <dgm:style>
+      <a:lnRef idx="2">
+        <a:scrgbClr r="0" g="0" b="0"/>
+      </a:lnRef>
+      <a:fillRef idx="1">
+        <a:scrgbClr r="0" g="0" b="0"/>
+      </a:fillRef>
+      <a:effectRef idx="0">
+        <a:scrgbClr r="0" g="0" b="0"/>
+      </a:effectRef>
+      <a:fontRef idx="minor"/>
+    </dgm:style>
+  </dgm:styleLbl>
+  <dgm:styleLbl name="fgAcc0">
+    <dgm:scene3d>
+      <a:camera prst="orthographicFront"/>
+      <a:lightRig rig="threePt" dir="t"/>
+    </dgm:scene3d>
+    <dgm:sp3d/>
+    <dgm:txPr/>
+    <dgm:style>
+      <a:lnRef idx="2">
+        <a:scrgbClr r="0" g="0" b="0"/>
+      </a:lnRef>
+      <a:fillRef idx="1">
+        <a:scrgbClr r="0" g="0" b="0"/>
+      </a:fillRef>
+      <a:effectRef idx="0">
+        <a:scrgbClr r="0" g="0" b="0"/>
+      </a:effectRef>
+      <a:fontRef idx="minor"/>
+    </dgm:style>
+  </dgm:styleLbl>
+  <dgm:styleLbl name="fgAcc2">
+    <dgm:scene3d>
+      <a:camera prst="orthographicFront"/>
+      <a:lightRig rig="threePt" dir="t"/>
+    </dgm:scene3d>
+    <dgm:sp3d/>
+    <dgm:txPr/>
+    <dgm:style>
+      <a:lnRef idx="2">
+        <a:scrgbClr r="0" g="0" b="0"/>
+      </a:lnRef>
+      <a:fillRef idx="1">
+        <a:scrgbClr r="0" g="0" b="0"/>
+      </a:fillRef>
+      <a:effectRef idx="0">
+        <a:scrgbClr r="0" g="0" b="0"/>
+      </a:effectRef>
+      <a:fontRef idx="minor"/>
+    </dgm:style>
+  </dgm:styleLbl>
+  <dgm:styleLbl name="fgAcc3">
+    <dgm:scene3d>
+      <a:camera prst="orthographicFront"/>
+      <a:lightRig rig="threePt" dir="t"/>
+    </dgm:scene3d>
+    <dgm:sp3d/>
+    <dgm:txPr/>
+    <dgm:style>
+      <a:lnRef idx="2">
+        <a:scrgbClr r="0" g="0" b="0"/>
+      </a:lnRef>
+      <a:fillRef idx="1">
+        <a:scrgbClr r="0" g="0" b="0"/>
+      </a:fillRef>
+      <a:effectRef idx="0">
+        <a:scrgbClr r="0" g="0" b="0"/>
+      </a:effectRef>
+      <a:fontRef idx="minor"/>
+    </dgm:style>
+  </dgm:styleLbl>
+  <dgm:styleLbl name="fgAcc4">
+    <dgm:scene3d>
+      <a:camera prst="orthographicFront"/>
+      <a:lightRig rig="threePt" dir="t"/>
+    </dgm:scene3d>
+    <dgm:sp3d/>
+    <dgm:txPr/>
+    <dgm:style>
+      <a:lnRef idx="2">
+        <a:scrgbClr r="0" g="0" b="0"/>
+      </a:lnRef>
+      <a:fillRef idx="1">
+        <a:scrgbClr r="0" g="0" b="0"/>
+      </a:fillRef>
+      <a:effectRef idx="0">
+        <a:scrgbClr r="0" g="0" b="0"/>
+      </a:effectRef>
+      <a:fontRef idx="minor"/>
+    </dgm:style>
+  </dgm:styleLbl>
+  <dgm:styleLbl name="bgShp">
+    <dgm:scene3d>
+      <a:camera prst="orthographicFront"/>
+      <a:lightRig rig="threePt" dir="t"/>
+    </dgm:scene3d>
+    <dgm:sp3d/>
+    <dgm:txPr/>
+    <dgm:style>
+      <a:lnRef idx="0">
+        <a:scrgbClr r="0" g="0" b="0"/>
+      </a:lnRef>
+      <a:fillRef idx="1">
+        <a:scrgbClr r="0" g="0" b="0"/>
+      </a:fillRef>
+      <a:effectRef idx="0">
+        <a:scrgbClr r="0" g="0" b="0"/>
+      </a:effectRef>
+      <a:fontRef idx="minor"/>
+    </dgm:style>
+  </dgm:styleLbl>
+  <dgm:styleLbl name="dkBgShp">
+    <dgm:scene3d>
+      <a:camera prst="orthographicFront"/>
+      <a:lightRig rig="threePt" dir="t"/>
+    </dgm:scene3d>
+    <dgm:sp3d/>
+    <dgm:txPr/>
+    <dgm:style>
+      <a:lnRef idx="0">
+        <a:scrgbClr r="0" g="0" b="0"/>
+      </a:lnRef>
+      <a:fillRef idx="1">
+        <a:scrgbClr r="0" g="0" b="0"/>
+      </a:fillRef>
+      <a:effectRef idx="0">
+        <a:scrgbClr r="0" g="0" b="0"/>
+      </a:effectRef>
+      <a:fontRef idx="minor"/>
+    </dgm:style>
+  </dgm:styleLbl>
+  <dgm:styleLbl name="trBgShp">
+    <dgm:scene3d>
+      <a:camera prst="orthographicFront"/>
+      <a:lightRig rig="threePt" dir="t"/>
+    </dgm:scene3d>
+    <dgm:sp3d/>
+    <dgm:txPr/>
+    <dgm:style>
+      <a:lnRef idx="0">
+        <a:scrgbClr r="0" g="0" b="0"/>
+      </a:lnRef>
+      <a:fillRef idx="1">
+        <a:scrgbClr r="0" g="0" b="0"/>
+      </a:fillRef>
+      <a:effectRef idx="0">
+        <a:scrgbClr r="0" g="0" b="0"/>
+      </a:effectRef>
+      <a:fontRef idx="minor"/>
+    </dgm:style>
+  </dgm:styleLbl>
+  <dgm:styleLbl name="fgShp">
+    <dgm:scene3d>
+      <a:camera prst="orthographicFront"/>
+      <a:lightRig rig="threePt" dir="t"/>
+    </dgm:scene3d>
+    <dgm:sp3d/>
+    <dgm:txPr/>
+    <dgm:style>
+      <a:lnRef idx="2">
+        <a:scrgbClr r="0" g="0" b="0"/>
+      </a:lnRef>
+      <a:fillRef idx="1">
+        <a:scrgbClr r="0" g="0" b="0"/>
+      </a:fillRef>
+      <a:effectRef idx="0">
+        <a:scrgbClr r="0" g="0" b="0"/>
+      </a:effectRef>
+      <a:fontRef idx="minor"/>
+    </dgm:style>
+  </dgm:styleLbl>
+  <dgm:styleLbl name="revTx">
+    <dgm:scene3d>
+      <a:camera prst="orthographicFront"/>
+      <a:lightRig rig="threePt" dir="t"/>
+    </dgm:scene3d>
+    <dgm:sp3d/>
+    <dgm:txPr/>
+    <dgm:style>
+      <a:lnRef idx="0">
+        <a:scrgbClr r="0" g="0" b="0"/>
+      </a:lnRef>
+      <a:fillRef idx="0">
+        <a:scrgbClr r="0" g="0" b="0"/>
+      </a:fillRef>
+      <a:effectRef idx="0">
+        <a:scrgbClr r="0" g="0" b="0"/>
+      </a:effectRef>
+      <a:fontRef idx="minor"/>
+    </dgm:style>
+  </dgm:styleLbl>
+</dgm:styleDef>
+</file>
+
+<file path=ppt/diagrams/quickStyle2.xml><?xml version="1.0" encoding="utf-8"?>
 <dgm:styleDef xmlns:dgm="http://schemas.openxmlformats.org/drawingml/2006/diagram" xmlns:a="http://schemas.openxmlformats.org/drawingml/2006/main" uniqueId="urn:microsoft.com/office/officeart/2005/8/quickstyle/simple1">
   <dgm:title val=""/>
   <dgm:desc val=""/>
@@ -5807,7 +9381,7 @@
           <a:p>
             <a:fld id="{71481ED2-D2F7-4FF1-878A-F6023F465571}" type="datetimeFigureOut">
               <a:rPr lang="en-CA" smtClean="0"/>
-              <a:t>2022-07-24</a:t>
+              <a:t>2022-07-25</a:t>
             </a:fld>
             <a:endParaRPr lang="en-CA"/>
           </a:p>
@@ -6007,7 +9581,7 @@
           <a:p>
             <a:fld id="{71481ED2-D2F7-4FF1-878A-F6023F465571}" type="datetimeFigureOut">
               <a:rPr lang="en-CA" smtClean="0"/>
-              <a:t>2022-07-24</a:t>
+              <a:t>2022-07-25</a:t>
             </a:fld>
             <a:endParaRPr lang="en-CA"/>
           </a:p>
@@ -6217,7 +9791,7 @@
           <a:p>
             <a:fld id="{71481ED2-D2F7-4FF1-878A-F6023F465571}" type="datetimeFigureOut">
               <a:rPr lang="en-CA" smtClean="0"/>
-              <a:t>2022-07-24</a:t>
+              <a:t>2022-07-25</a:t>
             </a:fld>
             <a:endParaRPr lang="en-CA"/>
           </a:p>
@@ -6417,7 +9991,7 @@
           <a:p>
             <a:fld id="{71481ED2-D2F7-4FF1-878A-F6023F465571}" type="datetimeFigureOut">
               <a:rPr lang="en-CA" smtClean="0"/>
-              <a:t>2022-07-24</a:t>
+              <a:t>2022-07-25</a:t>
             </a:fld>
             <a:endParaRPr lang="en-CA"/>
           </a:p>
@@ -6693,7 +10267,7 @@
           <a:p>
             <a:fld id="{71481ED2-D2F7-4FF1-878A-F6023F465571}" type="datetimeFigureOut">
               <a:rPr lang="en-CA" smtClean="0"/>
-              <a:t>2022-07-24</a:t>
+              <a:t>2022-07-25</a:t>
             </a:fld>
             <a:endParaRPr lang="en-CA"/>
           </a:p>
@@ -6961,7 +10535,7 @@
           <a:p>
             <a:fld id="{71481ED2-D2F7-4FF1-878A-F6023F465571}" type="datetimeFigureOut">
               <a:rPr lang="en-CA" smtClean="0"/>
-              <a:t>2022-07-24</a:t>
+              <a:t>2022-07-25</a:t>
             </a:fld>
             <a:endParaRPr lang="en-CA"/>
           </a:p>
@@ -7376,7 +10950,7 @@
           <a:p>
             <a:fld id="{71481ED2-D2F7-4FF1-878A-F6023F465571}" type="datetimeFigureOut">
               <a:rPr lang="en-CA" smtClean="0"/>
-              <a:t>2022-07-24</a:t>
+              <a:t>2022-07-25</a:t>
             </a:fld>
             <a:endParaRPr lang="en-CA"/>
           </a:p>
@@ -7518,7 +11092,7 @@
           <a:p>
             <a:fld id="{71481ED2-D2F7-4FF1-878A-F6023F465571}" type="datetimeFigureOut">
               <a:rPr lang="en-CA" smtClean="0"/>
-              <a:t>2022-07-24</a:t>
+              <a:t>2022-07-25</a:t>
             </a:fld>
             <a:endParaRPr lang="en-CA"/>
           </a:p>
@@ -7631,7 +11205,7 @@
           <a:p>
             <a:fld id="{71481ED2-D2F7-4FF1-878A-F6023F465571}" type="datetimeFigureOut">
               <a:rPr lang="en-CA" smtClean="0"/>
-              <a:t>2022-07-24</a:t>
+              <a:t>2022-07-25</a:t>
             </a:fld>
             <a:endParaRPr lang="en-CA"/>
           </a:p>
@@ -7944,7 +11518,7 @@
           <a:p>
             <a:fld id="{71481ED2-D2F7-4FF1-878A-F6023F465571}" type="datetimeFigureOut">
               <a:rPr lang="en-CA" smtClean="0"/>
-              <a:t>2022-07-24</a:t>
+              <a:t>2022-07-25</a:t>
             </a:fld>
             <a:endParaRPr lang="en-CA"/>
           </a:p>
@@ -8233,7 +11807,7 @@
           <a:p>
             <a:fld id="{71481ED2-D2F7-4FF1-878A-F6023F465571}" type="datetimeFigureOut">
               <a:rPr lang="en-CA" smtClean="0"/>
-              <a:t>2022-07-24</a:t>
+              <a:t>2022-07-25</a:t>
             </a:fld>
             <a:endParaRPr lang="en-CA"/>
           </a:p>
@@ -8476,7 +12050,7 @@
           <a:p>
             <a:fld id="{71481ED2-D2F7-4FF1-878A-F6023F465571}" type="datetimeFigureOut">
               <a:rPr lang="en-CA" smtClean="0"/>
-              <a:t>2022-07-24</a:t>
+              <a:t>2022-07-25</a:t>
             </a:fld>
             <a:endParaRPr lang="en-CA"/>
           </a:p>
@@ -9399,31 +12973,37 @@
           </a:p>
         </p:txBody>
       </p:sp>
-      <p:sp>
-        <p:nvSpPr>
-          <p:cNvPr id="3" name="Content Placeholder 2">
+      <p:graphicFrame>
+        <p:nvGraphicFramePr>
+          <p:cNvPr id="4" name="Content Placeholder 3">
             <a:extLst>
               <a:ext uri="{FF2B5EF4-FFF2-40B4-BE49-F238E27FC236}">
-                <a16:creationId xmlns:a16="http://schemas.microsoft.com/office/drawing/2014/main" id="{3782013C-F910-F0D5-14B6-39549012598A}"/>
+                <a16:creationId xmlns:a16="http://schemas.microsoft.com/office/drawing/2014/main" id="{4DEA15BC-4A2E-2325-DE40-943B5333B3A7}"/>
               </a:ext>
             </a:extLst>
           </p:cNvPr>
-          <p:cNvSpPr>
-            <a:spLocks noGrp="1"/>
-          </p:cNvSpPr>
+          <p:cNvGraphicFramePr>
+            <a:graphicFrameLocks noGrp="1"/>
+          </p:cNvGraphicFramePr>
           <p:nvPr>
             <p:ph idx="1"/>
+            <p:extLst>
+              <p:ext uri="{D42A27DB-BD31-4B8C-83A1-F6EECF244321}">
+                <p14:modId xmlns:p14="http://schemas.microsoft.com/office/powerpoint/2010/main" val="1445700061"/>
+              </p:ext>
+            </p:extLst>
           </p:nvPr>
-        </p:nvSpPr>
-        <p:spPr/>
-        <p:txBody>
-          <a:bodyPr/>
-          <a:lstStyle/>
-          <a:p>
-            <a:endParaRPr lang="en-CA"/>
-          </a:p>
-        </p:txBody>
-      </p:sp>
+        </p:nvGraphicFramePr>
+        <p:xfrm>
+          <a:off x="838200" y="1825625"/>
+          <a:ext cx="10515600" cy="4351338"/>
+        </p:xfrm>
+        <a:graphic>
+          <a:graphicData uri="http://schemas.openxmlformats.org/drawingml/2006/diagram">
+            <dgm:relIds xmlns:dgm="http://schemas.openxmlformats.org/drawingml/2006/diagram" xmlns:r="http://schemas.openxmlformats.org/officeDocument/2006/relationships" r:dm="rId2" r:lo="rId3" r:qs="rId4" r:cs="rId5"/>
+          </a:graphicData>
+        </a:graphic>
+      </p:graphicFrame>
     </p:spTree>
     <p:extLst>
       <p:ext uri="{BB962C8B-B14F-4D97-AF65-F5344CB8AC3E}">

</xml_diff>

<commit_message>
give up on policy lol
</commit_message>
<xml_diff>
--- a/radica.pptx
+++ b/radica.pptx
@@ -11,6 +11,7 @@
     <p:sldId id="262" r:id="rId5"/>
     <p:sldId id="264" r:id="rId6"/>
     <p:sldId id="265" r:id="rId7"/>
+    <p:sldId id="266" r:id="rId8"/>
   </p:sldIdLst>
   <p:sldSz cx="12192000" cy="6858000"/>
   <p:notesSz cx="6858000" cy="9144000"/>
@@ -9381,7 +9382,7 @@
           <a:p>
             <a:fld id="{71481ED2-D2F7-4FF1-878A-F6023F465571}" type="datetimeFigureOut">
               <a:rPr lang="en-CA" smtClean="0"/>
-              <a:t>2022-07-25</a:t>
+              <a:t>2022-07-29</a:t>
             </a:fld>
             <a:endParaRPr lang="en-CA"/>
           </a:p>
@@ -9581,7 +9582,7 @@
           <a:p>
             <a:fld id="{71481ED2-D2F7-4FF1-878A-F6023F465571}" type="datetimeFigureOut">
               <a:rPr lang="en-CA" smtClean="0"/>
-              <a:t>2022-07-25</a:t>
+              <a:t>2022-07-29</a:t>
             </a:fld>
             <a:endParaRPr lang="en-CA"/>
           </a:p>
@@ -9791,7 +9792,7 @@
           <a:p>
             <a:fld id="{71481ED2-D2F7-4FF1-878A-F6023F465571}" type="datetimeFigureOut">
               <a:rPr lang="en-CA" smtClean="0"/>
-              <a:t>2022-07-25</a:t>
+              <a:t>2022-07-29</a:t>
             </a:fld>
             <a:endParaRPr lang="en-CA"/>
           </a:p>
@@ -9991,7 +9992,7 @@
           <a:p>
             <a:fld id="{71481ED2-D2F7-4FF1-878A-F6023F465571}" type="datetimeFigureOut">
               <a:rPr lang="en-CA" smtClean="0"/>
-              <a:t>2022-07-25</a:t>
+              <a:t>2022-07-29</a:t>
             </a:fld>
             <a:endParaRPr lang="en-CA"/>
           </a:p>
@@ -10267,7 +10268,7 @@
           <a:p>
             <a:fld id="{71481ED2-D2F7-4FF1-878A-F6023F465571}" type="datetimeFigureOut">
               <a:rPr lang="en-CA" smtClean="0"/>
-              <a:t>2022-07-25</a:t>
+              <a:t>2022-07-29</a:t>
             </a:fld>
             <a:endParaRPr lang="en-CA"/>
           </a:p>
@@ -10535,7 +10536,7 @@
           <a:p>
             <a:fld id="{71481ED2-D2F7-4FF1-878A-F6023F465571}" type="datetimeFigureOut">
               <a:rPr lang="en-CA" smtClean="0"/>
-              <a:t>2022-07-25</a:t>
+              <a:t>2022-07-29</a:t>
             </a:fld>
             <a:endParaRPr lang="en-CA"/>
           </a:p>
@@ -10950,7 +10951,7 @@
           <a:p>
             <a:fld id="{71481ED2-D2F7-4FF1-878A-F6023F465571}" type="datetimeFigureOut">
               <a:rPr lang="en-CA" smtClean="0"/>
-              <a:t>2022-07-25</a:t>
+              <a:t>2022-07-29</a:t>
             </a:fld>
             <a:endParaRPr lang="en-CA"/>
           </a:p>
@@ -11092,7 +11093,7 @@
           <a:p>
             <a:fld id="{71481ED2-D2F7-4FF1-878A-F6023F465571}" type="datetimeFigureOut">
               <a:rPr lang="en-CA" smtClean="0"/>
-              <a:t>2022-07-25</a:t>
+              <a:t>2022-07-29</a:t>
             </a:fld>
             <a:endParaRPr lang="en-CA"/>
           </a:p>
@@ -11205,7 +11206,7 @@
           <a:p>
             <a:fld id="{71481ED2-D2F7-4FF1-878A-F6023F465571}" type="datetimeFigureOut">
               <a:rPr lang="en-CA" smtClean="0"/>
-              <a:t>2022-07-25</a:t>
+              <a:t>2022-07-29</a:t>
             </a:fld>
             <a:endParaRPr lang="en-CA"/>
           </a:p>
@@ -11518,7 +11519,7 @@
           <a:p>
             <a:fld id="{71481ED2-D2F7-4FF1-878A-F6023F465571}" type="datetimeFigureOut">
               <a:rPr lang="en-CA" smtClean="0"/>
-              <a:t>2022-07-25</a:t>
+              <a:t>2022-07-29</a:t>
             </a:fld>
             <a:endParaRPr lang="en-CA"/>
           </a:p>
@@ -11807,7 +11808,7 @@
           <a:p>
             <a:fld id="{71481ED2-D2F7-4FF1-878A-F6023F465571}" type="datetimeFigureOut">
               <a:rPr lang="en-CA" smtClean="0"/>
-              <a:t>2022-07-25</a:t>
+              <a:t>2022-07-29</a:t>
             </a:fld>
             <a:endParaRPr lang="en-CA"/>
           </a:p>
@@ -12050,7 +12051,7 @@
           <a:p>
             <a:fld id="{71481ED2-D2F7-4FF1-878A-F6023F465571}" type="datetimeFigureOut">
               <a:rPr lang="en-CA" smtClean="0"/>
-              <a:t>2022-07-25</a:t>
+              <a:t>2022-07-29</a:t>
             </a:fld>
             <a:endParaRPr lang="en-CA"/>
           </a:p>
@@ -13017,6 +13018,127 @@
 </p:sld>
 </file>
 
+<file path=ppt/slides/slide7.xml><?xml version="1.0" encoding="utf-8"?>
+<p:sld xmlns:a="http://schemas.openxmlformats.org/drawingml/2006/main" xmlns:r="http://schemas.openxmlformats.org/officeDocument/2006/relationships" xmlns:p="http://schemas.openxmlformats.org/presentationml/2006/main">
+  <p:cSld>
+    <p:spTree>
+      <p:nvGrpSpPr>
+        <p:cNvPr id="1" name=""/>
+        <p:cNvGrpSpPr/>
+        <p:nvPr/>
+      </p:nvGrpSpPr>
+      <p:grpSpPr>
+        <a:xfrm>
+          <a:off x="0" y="0"/>
+          <a:ext cx="0" cy="0"/>
+          <a:chOff x="0" y="0"/>
+          <a:chExt cx="0" cy="0"/>
+        </a:xfrm>
+      </p:grpSpPr>
+      <p:sp>
+        <p:nvSpPr>
+          <p:cNvPr id="2" name="Title 1">
+            <a:extLst>
+              <a:ext uri="{FF2B5EF4-FFF2-40B4-BE49-F238E27FC236}">
+                <a16:creationId xmlns:a16="http://schemas.microsoft.com/office/drawing/2014/main" id="{8AA078CE-1721-FDBE-FDCB-229D62769EFD}"/>
+              </a:ext>
+            </a:extLst>
+          </p:cNvPr>
+          <p:cNvSpPr>
+            <a:spLocks noGrp="1"/>
+          </p:cNvSpPr>
+          <p:nvPr>
+            <p:ph type="title"/>
+          </p:nvPr>
+        </p:nvSpPr>
+        <p:spPr/>
+        <p:txBody>
+          <a:bodyPr/>
+          <a:lstStyle/>
+          <a:p>
+            <a:r>
+              <a:rPr lang="en-CA" dirty="0"/>
+              <a:t>Update</a:t>
+            </a:r>
+          </a:p>
+        </p:txBody>
+      </p:sp>
+      <p:sp>
+        <p:nvSpPr>
+          <p:cNvPr id="3" name="Content Placeholder 2">
+            <a:extLst>
+              <a:ext uri="{FF2B5EF4-FFF2-40B4-BE49-F238E27FC236}">
+                <a16:creationId xmlns:a16="http://schemas.microsoft.com/office/drawing/2014/main" id="{269198ED-6D4D-2CD4-0F19-31C31B6C72E9}"/>
+              </a:ext>
+            </a:extLst>
+          </p:cNvPr>
+          <p:cNvSpPr>
+            <a:spLocks noGrp="1"/>
+          </p:cNvSpPr>
+          <p:nvPr>
+            <p:ph idx="1"/>
+          </p:nvPr>
+        </p:nvSpPr>
+        <p:spPr/>
+        <p:txBody>
+          <a:bodyPr/>
+          <a:lstStyle/>
+          <a:p>
+            <a:r>
+              <a:rPr lang="en-CA" dirty="0"/>
+              <a:t>Transformers apply </a:t>
+            </a:r>
+          </a:p>
+          <a:p>
+            <a:pPr lvl="1"/>
+            <a:r>
+              <a:rPr lang="en-CA" dirty="0"/>
+              <a:t>Dereference</a:t>
+            </a:r>
+          </a:p>
+          <a:p>
+            <a:pPr lvl="1"/>
+            <a:r>
+              <a:rPr lang="en-CA" dirty="0"/>
+              <a:t>Password hasher</a:t>
+            </a:r>
+          </a:p>
+          <a:p>
+            <a:pPr lvl="1"/>
+            <a:r>
+              <a:rPr lang="en-CA" dirty="0" err="1"/>
+              <a:t>Etc</a:t>
+            </a:r>
+            <a:endParaRPr lang="en-CA" dirty="0"/>
+          </a:p>
+          <a:p>
+            <a:r>
+              <a:rPr lang="en-CA" dirty="0"/>
+              <a:t>Policy apply</a:t>
+            </a:r>
+          </a:p>
+          <a:p>
+            <a:pPr lvl="1"/>
+            <a:r>
+              <a:rPr lang="en-CA" dirty="0"/>
+              <a:t>New dates must be valid</a:t>
+            </a:r>
+          </a:p>
+        </p:txBody>
+      </p:sp>
+    </p:spTree>
+    <p:extLst>
+      <p:ext uri="{BB962C8B-B14F-4D97-AF65-F5344CB8AC3E}">
+        <p14:creationId xmlns:p14="http://schemas.microsoft.com/office/powerpoint/2010/main" val="3765158976"/>
+      </p:ext>
+    </p:extLst>
+  </p:cSld>
+  <p:clrMapOvr>
+    <a:masterClrMapping/>
+  </p:clrMapOvr>
+</p:sld>
+</file>
+
 <file path=ppt/theme/theme1.xml><?xml version="1.0" encoding="utf-8"?>
 <a:theme xmlns:a="http://schemas.openxmlformats.org/drawingml/2006/main" name="Office Theme">
   <a:themeElements>

</xml_diff>